<commit_message>
moved the changes to aspcore githb repository
</commit_message>
<xml_diff>
--- a/wwwroot/Presentation/Template.pptx
+++ b/wwwroot/Presentation/Template.pptx
@@ -7,8 +7,7 @@
   <p:sldIdLst>
     <p:sldId id="256" r:id="rId2"/>
     <p:sldId id="260" r:id="rId3"/>
-    <p:sldId id="258" r:id="rId4"/>
-    <p:sldId id="261" r:id="rId5"/>
+    <p:sldId id="261" r:id="rId4"/>
   </p:sldIdLst>
   <p:sldSz cx="12192000" cy="6858000"/>
   <p:notesSz cx="6858000" cy="9144000"/>
@@ -1140,3217 +1139,6 @@
 </cs:chartStyle>
 </file>
 
-<file path=ppt/diagrams/colors1.xml><?xml version="1.0" encoding="utf-8"?>
-<dgm:colorsDef xmlns:dgm="http://schemas.openxmlformats.org/drawingml/2006/diagram" xmlns:a="http://schemas.openxmlformats.org/drawingml/2006/main" uniqueId="urn:microsoft.com/office/officeart/2005/8/colors/accent1_2">
-  <dgm:title val=""/>
-  <dgm:desc val=""/>
-  <dgm:catLst>
-    <dgm:cat type="accent1" pri="11200"/>
-  </dgm:catLst>
-  <dgm:styleLbl name="node0">
-    <dgm:fillClrLst meth="repeat">
-      <a:schemeClr val="accent1"/>
-    </dgm:fillClrLst>
-    <dgm:linClrLst meth="repeat">
-      <a:schemeClr val="lt1"/>
-    </dgm:linClrLst>
-    <dgm:effectClrLst/>
-    <dgm:txLinClrLst/>
-    <dgm:txFillClrLst/>
-    <dgm:txEffectClrLst/>
-  </dgm:styleLbl>
-  <dgm:styleLbl name="alignNode1">
-    <dgm:fillClrLst meth="repeat">
-      <a:schemeClr val="accent1"/>
-    </dgm:fillClrLst>
-    <dgm:linClrLst meth="repeat">
-      <a:schemeClr val="accent1"/>
-    </dgm:linClrLst>
-    <dgm:effectClrLst/>
-    <dgm:txLinClrLst/>
-    <dgm:txFillClrLst/>
-    <dgm:txEffectClrLst/>
-  </dgm:styleLbl>
-  <dgm:styleLbl name="node1">
-    <dgm:fillClrLst meth="repeat">
-      <a:schemeClr val="accent1"/>
-    </dgm:fillClrLst>
-    <dgm:linClrLst meth="repeat">
-      <a:schemeClr val="lt1"/>
-    </dgm:linClrLst>
-    <dgm:effectClrLst/>
-    <dgm:txLinClrLst/>
-    <dgm:txFillClrLst/>
-    <dgm:txEffectClrLst/>
-  </dgm:styleLbl>
-  <dgm:styleLbl name="lnNode1">
-    <dgm:fillClrLst meth="repeat">
-      <a:schemeClr val="accent1"/>
-    </dgm:fillClrLst>
-    <dgm:linClrLst meth="repeat">
-      <a:schemeClr val="lt1"/>
-    </dgm:linClrLst>
-    <dgm:effectClrLst/>
-    <dgm:txLinClrLst/>
-    <dgm:txFillClrLst/>
-    <dgm:txEffectClrLst/>
-  </dgm:styleLbl>
-  <dgm:styleLbl name="vennNode1">
-    <dgm:fillClrLst meth="repeat">
-      <a:schemeClr val="accent1">
-        <a:alpha val="50000"/>
-      </a:schemeClr>
-    </dgm:fillClrLst>
-    <dgm:linClrLst meth="repeat">
-      <a:schemeClr val="lt1"/>
-    </dgm:linClrLst>
-    <dgm:effectClrLst/>
-    <dgm:txLinClrLst/>
-    <dgm:txFillClrLst/>
-    <dgm:txEffectClrLst/>
-  </dgm:styleLbl>
-  <dgm:styleLbl name="node2">
-    <dgm:fillClrLst meth="repeat">
-      <a:schemeClr val="accent1"/>
-    </dgm:fillClrLst>
-    <dgm:linClrLst meth="repeat">
-      <a:schemeClr val="lt1"/>
-    </dgm:linClrLst>
-    <dgm:effectClrLst/>
-    <dgm:txLinClrLst/>
-    <dgm:txFillClrLst/>
-    <dgm:txEffectClrLst/>
-  </dgm:styleLbl>
-  <dgm:styleLbl name="node3">
-    <dgm:fillClrLst meth="repeat">
-      <a:schemeClr val="accent1"/>
-    </dgm:fillClrLst>
-    <dgm:linClrLst meth="repeat">
-      <a:schemeClr val="lt1"/>
-    </dgm:linClrLst>
-    <dgm:effectClrLst/>
-    <dgm:txLinClrLst/>
-    <dgm:txFillClrLst/>
-    <dgm:txEffectClrLst/>
-  </dgm:styleLbl>
-  <dgm:styleLbl name="node4">
-    <dgm:fillClrLst meth="repeat">
-      <a:schemeClr val="accent1"/>
-    </dgm:fillClrLst>
-    <dgm:linClrLst meth="repeat">
-      <a:schemeClr val="lt1"/>
-    </dgm:linClrLst>
-    <dgm:effectClrLst/>
-    <dgm:txLinClrLst/>
-    <dgm:txFillClrLst/>
-    <dgm:txEffectClrLst/>
-  </dgm:styleLbl>
-  <dgm:styleLbl name="fgImgPlace1">
-    <dgm:fillClrLst meth="repeat">
-      <a:schemeClr val="accent1">
-        <a:tint val="50000"/>
-      </a:schemeClr>
-    </dgm:fillClrLst>
-    <dgm:linClrLst meth="repeat">
-      <a:schemeClr val="lt1"/>
-    </dgm:linClrLst>
-    <dgm:effectClrLst/>
-    <dgm:txLinClrLst/>
-    <dgm:txFillClrLst meth="repeat">
-      <a:schemeClr val="lt1"/>
-    </dgm:txFillClrLst>
-    <dgm:txEffectClrLst/>
-  </dgm:styleLbl>
-  <dgm:styleLbl name="alignImgPlace1">
-    <dgm:fillClrLst meth="repeat">
-      <a:schemeClr val="accent1">
-        <a:tint val="50000"/>
-      </a:schemeClr>
-    </dgm:fillClrLst>
-    <dgm:linClrLst meth="repeat">
-      <a:schemeClr val="lt1"/>
-    </dgm:linClrLst>
-    <dgm:effectClrLst/>
-    <dgm:txLinClrLst/>
-    <dgm:txFillClrLst meth="repeat">
-      <a:schemeClr val="lt1"/>
-    </dgm:txFillClrLst>
-    <dgm:txEffectClrLst/>
-  </dgm:styleLbl>
-  <dgm:styleLbl name="bgImgPlace1">
-    <dgm:fillClrLst meth="repeat">
-      <a:schemeClr val="accent1">
-        <a:tint val="50000"/>
-      </a:schemeClr>
-    </dgm:fillClrLst>
-    <dgm:linClrLst meth="repeat">
-      <a:schemeClr val="lt1"/>
-    </dgm:linClrLst>
-    <dgm:effectClrLst/>
-    <dgm:txLinClrLst/>
-    <dgm:txFillClrLst meth="repeat">
-      <a:schemeClr val="lt1"/>
-    </dgm:txFillClrLst>
-    <dgm:txEffectClrLst/>
-  </dgm:styleLbl>
-  <dgm:styleLbl name="sibTrans2D1">
-    <dgm:fillClrLst meth="repeat">
-      <a:schemeClr val="accent1">
-        <a:tint val="60000"/>
-      </a:schemeClr>
-    </dgm:fillClrLst>
-    <dgm:linClrLst meth="repeat">
-      <a:schemeClr val="accent1">
-        <a:tint val="60000"/>
-      </a:schemeClr>
-    </dgm:linClrLst>
-    <dgm:effectClrLst/>
-    <dgm:txLinClrLst/>
-    <dgm:txFillClrLst/>
-    <dgm:txEffectClrLst/>
-  </dgm:styleLbl>
-  <dgm:styleLbl name="fgSibTrans2D1">
-    <dgm:fillClrLst meth="repeat">
-      <a:schemeClr val="accent1">
-        <a:tint val="60000"/>
-      </a:schemeClr>
-    </dgm:fillClrLst>
-    <dgm:linClrLst meth="repeat">
-      <a:schemeClr val="accent1">
-        <a:tint val="60000"/>
-      </a:schemeClr>
-    </dgm:linClrLst>
-    <dgm:effectClrLst/>
-    <dgm:txLinClrLst/>
-    <dgm:txFillClrLst/>
-    <dgm:txEffectClrLst/>
-  </dgm:styleLbl>
-  <dgm:styleLbl name="bgSibTrans2D1">
-    <dgm:fillClrLst meth="repeat">
-      <a:schemeClr val="accent1">
-        <a:tint val="60000"/>
-      </a:schemeClr>
-    </dgm:fillClrLst>
-    <dgm:linClrLst meth="repeat">
-      <a:schemeClr val="accent1">
-        <a:tint val="60000"/>
-      </a:schemeClr>
-    </dgm:linClrLst>
-    <dgm:effectClrLst/>
-    <dgm:txLinClrLst/>
-    <dgm:txFillClrLst/>
-    <dgm:txEffectClrLst/>
-  </dgm:styleLbl>
-  <dgm:styleLbl name="sibTrans1D1">
-    <dgm:fillClrLst meth="repeat">
-      <a:schemeClr val="accent1"/>
-    </dgm:fillClrLst>
-    <dgm:linClrLst meth="repeat">
-      <a:schemeClr val="accent1"/>
-    </dgm:linClrLst>
-    <dgm:effectClrLst/>
-    <dgm:txLinClrLst/>
-    <dgm:txFillClrLst meth="repeat">
-      <a:schemeClr val="tx1"/>
-    </dgm:txFillClrLst>
-    <dgm:txEffectClrLst/>
-  </dgm:styleLbl>
-  <dgm:styleLbl name="callout">
-    <dgm:fillClrLst meth="repeat">
-      <a:schemeClr val="accent1"/>
-    </dgm:fillClrLst>
-    <dgm:linClrLst meth="repeat">
-      <a:schemeClr val="accent1">
-        <a:tint val="50000"/>
-      </a:schemeClr>
-    </dgm:linClrLst>
-    <dgm:effectClrLst/>
-    <dgm:txLinClrLst/>
-    <dgm:txFillClrLst meth="repeat">
-      <a:schemeClr val="tx1"/>
-    </dgm:txFillClrLst>
-    <dgm:txEffectClrLst/>
-  </dgm:styleLbl>
-  <dgm:styleLbl name="asst0">
-    <dgm:fillClrLst meth="repeat">
-      <a:schemeClr val="accent1"/>
-    </dgm:fillClrLst>
-    <dgm:linClrLst meth="repeat">
-      <a:schemeClr val="lt1"/>
-    </dgm:linClrLst>
-    <dgm:effectClrLst/>
-    <dgm:txLinClrLst/>
-    <dgm:txFillClrLst/>
-    <dgm:txEffectClrLst/>
-  </dgm:styleLbl>
-  <dgm:styleLbl name="asst1">
-    <dgm:fillClrLst meth="repeat">
-      <a:schemeClr val="accent1"/>
-    </dgm:fillClrLst>
-    <dgm:linClrLst meth="repeat">
-      <a:schemeClr val="lt1"/>
-    </dgm:linClrLst>
-    <dgm:effectClrLst/>
-    <dgm:txLinClrLst/>
-    <dgm:txFillClrLst/>
-    <dgm:txEffectClrLst/>
-  </dgm:styleLbl>
-  <dgm:styleLbl name="asst2">
-    <dgm:fillClrLst meth="repeat">
-      <a:schemeClr val="accent1"/>
-    </dgm:fillClrLst>
-    <dgm:linClrLst meth="repeat">
-      <a:schemeClr val="lt1"/>
-    </dgm:linClrLst>
-    <dgm:effectClrLst/>
-    <dgm:txLinClrLst/>
-    <dgm:txFillClrLst/>
-    <dgm:txEffectClrLst/>
-  </dgm:styleLbl>
-  <dgm:styleLbl name="asst3">
-    <dgm:fillClrLst meth="repeat">
-      <a:schemeClr val="accent1"/>
-    </dgm:fillClrLst>
-    <dgm:linClrLst meth="repeat">
-      <a:schemeClr val="lt1"/>
-    </dgm:linClrLst>
-    <dgm:effectClrLst/>
-    <dgm:txLinClrLst/>
-    <dgm:txFillClrLst/>
-    <dgm:txEffectClrLst/>
-  </dgm:styleLbl>
-  <dgm:styleLbl name="asst4">
-    <dgm:fillClrLst meth="repeat">
-      <a:schemeClr val="accent1"/>
-    </dgm:fillClrLst>
-    <dgm:linClrLst meth="repeat">
-      <a:schemeClr val="lt1"/>
-    </dgm:linClrLst>
-    <dgm:effectClrLst/>
-    <dgm:txLinClrLst/>
-    <dgm:txFillClrLst/>
-    <dgm:txEffectClrLst/>
-  </dgm:styleLbl>
-  <dgm:styleLbl name="parChTrans2D1">
-    <dgm:fillClrLst meth="repeat">
-      <a:schemeClr val="accent1">
-        <a:tint val="60000"/>
-      </a:schemeClr>
-    </dgm:fillClrLst>
-    <dgm:linClrLst meth="repeat">
-      <a:schemeClr val="accent1">
-        <a:tint val="60000"/>
-      </a:schemeClr>
-    </dgm:linClrLst>
-    <dgm:effectClrLst/>
-    <dgm:txLinClrLst/>
-    <dgm:txFillClrLst meth="repeat">
-      <a:schemeClr val="lt1"/>
-    </dgm:txFillClrLst>
-    <dgm:txEffectClrLst/>
-  </dgm:styleLbl>
-  <dgm:styleLbl name="parChTrans2D2">
-    <dgm:fillClrLst meth="repeat">
-      <a:schemeClr val="accent1"/>
-    </dgm:fillClrLst>
-    <dgm:linClrLst meth="repeat">
-      <a:schemeClr val="accent1"/>
-    </dgm:linClrLst>
-    <dgm:effectClrLst/>
-    <dgm:txLinClrLst/>
-    <dgm:txFillClrLst meth="repeat">
-      <a:schemeClr val="lt1"/>
-    </dgm:txFillClrLst>
-    <dgm:txEffectClrLst/>
-  </dgm:styleLbl>
-  <dgm:styleLbl name="parChTrans2D3">
-    <dgm:fillClrLst meth="repeat">
-      <a:schemeClr val="accent1"/>
-    </dgm:fillClrLst>
-    <dgm:linClrLst meth="repeat">
-      <a:schemeClr val="accent1"/>
-    </dgm:linClrLst>
-    <dgm:effectClrLst/>
-    <dgm:txLinClrLst/>
-    <dgm:txFillClrLst meth="repeat">
-      <a:schemeClr val="lt1"/>
-    </dgm:txFillClrLst>
-    <dgm:txEffectClrLst/>
-  </dgm:styleLbl>
-  <dgm:styleLbl name="parChTrans2D4">
-    <dgm:fillClrLst meth="repeat">
-      <a:schemeClr val="accent1"/>
-    </dgm:fillClrLst>
-    <dgm:linClrLst meth="repeat">
-      <a:schemeClr val="accent1"/>
-    </dgm:linClrLst>
-    <dgm:effectClrLst/>
-    <dgm:txLinClrLst/>
-    <dgm:txFillClrLst meth="repeat">
-      <a:schemeClr val="lt1"/>
-    </dgm:txFillClrLst>
-    <dgm:txEffectClrLst/>
-  </dgm:styleLbl>
-  <dgm:styleLbl name="parChTrans1D1">
-    <dgm:fillClrLst meth="repeat">
-      <a:schemeClr val="accent1"/>
-    </dgm:fillClrLst>
-    <dgm:linClrLst meth="repeat">
-      <a:schemeClr val="accent1">
-        <a:shade val="60000"/>
-      </a:schemeClr>
-    </dgm:linClrLst>
-    <dgm:effectClrLst/>
-    <dgm:txLinClrLst/>
-    <dgm:txFillClrLst meth="repeat">
-      <a:schemeClr val="tx1"/>
-    </dgm:txFillClrLst>
-    <dgm:txEffectClrLst/>
-  </dgm:styleLbl>
-  <dgm:styleLbl name="parChTrans1D2">
-    <dgm:fillClrLst meth="repeat">
-      <a:schemeClr val="accent1"/>
-    </dgm:fillClrLst>
-    <dgm:linClrLst meth="repeat">
-      <a:schemeClr val="accent1">
-        <a:shade val="60000"/>
-      </a:schemeClr>
-    </dgm:linClrLst>
-    <dgm:effectClrLst/>
-    <dgm:txLinClrLst/>
-    <dgm:txFillClrLst meth="repeat">
-      <a:schemeClr val="tx1"/>
-    </dgm:txFillClrLst>
-    <dgm:txEffectClrLst/>
-  </dgm:styleLbl>
-  <dgm:styleLbl name="parChTrans1D3">
-    <dgm:fillClrLst meth="repeat">
-      <a:schemeClr val="accent1"/>
-    </dgm:fillClrLst>
-    <dgm:linClrLst meth="repeat">
-      <a:schemeClr val="accent1">
-        <a:shade val="80000"/>
-      </a:schemeClr>
-    </dgm:linClrLst>
-    <dgm:effectClrLst/>
-    <dgm:txLinClrLst/>
-    <dgm:txFillClrLst meth="repeat">
-      <a:schemeClr val="tx1"/>
-    </dgm:txFillClrLst>
-    <dgm:txEffectClrLst/>
-  </dgm:styleLbl>
-  <dgm:styleLbl name="parChTrans1D4">
-    <dgm:fillClrLst meth="repeat">
-      <a:schemeClr val="accent1"/>
-    </dgm:fillClrLst>
-    <dgm:linClrLst meth="repeat">
-      <a:schemeClr val="accent1">
-        <a:shade val="80000"/>
-      </a:schemeClr>
-    </dgm:linClrLst>
-    <dgm:effectClrLst/>
-    <dgm:txLinClrLst/>
-    <dgm:txFillClrLst meth="repeat">
-      <a:schemeClr val="tx1"/>
-    </dgm:txFillClrLst>
-    <dgm:txEffectClrLst/>
-  </dgm:styleLbl>
-  <dgm:styleLbl name="fgAcc1">
-    <dgm:fillClrLst meth="repeat">
-      <a:schemeClr val="lt1">
-        <a:alpha val="90000"/>
-      </a:schemeClr>
-    </dgm:fillClrLst>
-    <dgm:linClrLst meth="repeat">
-      <a:schemeClr val="accent1"/>
-    </dgm:linClrLst>
-    <dgm:effectClrLst/>
-    <dgm:txLinClrLst/>
-    <dgm:txFillClrLst meth="repeat">
-      <a:schemeClr val="dk1"/>
-    </dgm:txFillClrLst>
-    <dgm:txEffectClrLst/>
-  </dgm:styleLbl>
-  <dgm:styleLbl name="conFgAcc1">
-    <dgm:fillClrLst meth="repeat">
-      <a:schemeClr val="lt1">
-        <a:alpha val="90000"/>
-      </a:schemeClr>
-    </dgm:fillClrLst>
-    <dgm:linClrLst meth="repeat">
-      <a:schemeClr val="accent1"/>
-    </dgm:linClrLst>
-    <dgm:effectClrLst/>
-    <dgm:txLinClrLst/>
-    <dgm:txFillClrLst meth="repeat">
-      <a:schemeClr val="dk1"/>
-    </dgm:txFillClrLst>
-    <dgm:txEffectClrLst/>
-  </dgm:styleLbl>
-  <dgm:styleLbl name="alignAcc1">
-    <dgm:fillClrLst meth="repeat">
-      <a:schemeClr val="lt1">
-        <a:alpha val="90000"/>
-      </a:schemeClr>
-    </dgm:fillClrLst>
-    <dgm:linClrLst meth="repeat">
-      <a:schemeClr val="accent1"/>
-    </dgm:linClrLst>
-    <dgm:effectClrLst/>
-    <dgm:txLinClrLst/>
-    <dgm:txFillClrLst meth="repeat">
-      <a:schemeClr val="dk1"/>
-    </dgm:txFillClrLst>
-    <dgm:txEffectClrLst/>
-  </dgm:styleLbl>
-  <dgm:styleLbl name="trAlignAcc1">
-    <dgm:fillClrLst meth="repeat">
-      <a:schemeClr val="lt1">
-        <a:alpha val="40000"/>
-      </a:schemeClr>
-    </dgm:fillClrLst>
-    <dgm:linClrLst meth="repeat">
-      <a:schemeClr val="accent1"/>
-    </dgm:linClrLst>
-    <dgm:effectClrLst/>
-    <dgm:txLinClrLst/>
-    <dgm:txFillClrLst meth="repeat">
-      <a:schemeClr val="dk1"/>
-    </dgm:txFillClrLst>
-    <dgm:txEffectClrLst/>
-  </dgm:styleLbl>
-  <dgm:styleLbl name="bgAcc1">
-    <dgm:fillClrLst meth="repeat">
-      <a:schemeClr val="lt1">
-        <a:alpha val="90000"/>
-      </a:schemeClr>
-    </dgm:fillClrLst>
-    <dgm:linClrLst meth="repeat">
-      <a:schemeClr val="accent1"/>
-    </dgm:linClrLst>
-    <dgm:effectClrLst/>
-    <dgm:txLinClrLst/>
-    <dgm:txFillClrLst meth="repeat">
-      <a:schemeClr val="dk1"/>
-    </dgm:txFillClrLst>
-    <dgm:txEffectClrLst/>
-  </dgm:styleLbl>
-  <dgm:styleLbl name="solidFgAcc1">
-    <dgm:fillClrLst meth="repeat">
-      <a:schemeClr val="lt1"/>
-    </dgm:fillClrLst>
-    <dgm:linClrLst meth="repeat">
-      <a:schemeClr val="accent1"/>
-    </dgm:linClrLst>
-    <dgm:effectClrLst/>
-    <dgm:txLinClrLst/>
-    <dgm:txFillClrLst meth="repeat">
-      <a:schemeClr val="dk1"/>
-    </dgm:txFillClrLst>
-    <dgm:txEffectClrLst/>
-  </dgm:styleLbl>
-  <dgm:styleLbl name="solidAlignAcc1">
-    <dgm:fillClrLst meth="repeat">
-      <a:schemeClr val="lt1"/>
-    </dgm:fillClrLst>
-    <dgm:linClrLst meth="repeat">
-      <a:schemeClr val="accent1"/>
-    </dgm:linClrLst>
-    <dgm:effectClrLst/>
-    <dgm:txLinClrLst/>
-    <dgm:txFillClrLst meth="repeat">
-      <a:schemeClr val="dk1"/>
-    </dgm:txFillClrLst>
-    <dgm:txEffectClrLst/>
-  </dgm:styleLbl>
-  <dgm:styleLbl name="solidBgAcc1">
-    <dgm:fillClrLst meth="repeat">
-      <a:schemeClr val="lt1"/>
-    </dgm:fillClrLst>
-    <dgm:linClrLst meth="repeat">
-      <a:schemeClr val="accent1"/>
-    </dgm:linClrLst>
-    <dgm:effectClrLst/>
-    <dgm:txLinClrLst/>
-    <dgm:txFillClrLst meth="repeat">
-      <a:schemeClr val="dk1"/>
-    </dgm:txFillClrLst>
-    <dgm:txEffectClrLst/>
-  </dgm:styleLbl>
-  <dgm:styleLbl name="fgAccFollowNode1">
-    <dgm:fillClrLst meth="repeat">
-      <a:schemeClr val="accent1">
-        <a:alpha val="90000"/>
-        <a:tint val="40000"/>
-      </a:schemeClr>
-    </dgm:fillClrLst>
-    <dgm:linClrLst meth="repeat">
-      <a:schemeClr val="accent1">
-        <a:alpha val="90000"/>
-        <a:tint val="40000"/>
-      </a:schemeClr>
-    </dgm:linClrLst>
-    <dgm:effectClrLst/>
-    <dgm:txLinClrLst/>
-    <dgm:txFillClrLst meth="repeat">
-      <a:schemeClr val="dk1"/>
-    </dgm:txFillClrLst>
-    <dgm:txEffectClrLst/>
-  </dgm:styleLbl>
-  <dgm:styleLbl name="alignAccFollowNode1">
-    <dgm:fillClrLst meth="repeat">
-      <a:schemeClr val="accent1">
-        <a:alpha val="90000"/>
-        <a:tint val="40000"/>
-      </a:schemeClr>
-    </dgm:fillClrLst>
-    <dgm:linClrLst meth="repeat">
-      <a:schemeClr val="accent1">
-        <a:alpha val="90000"/>
-        <a:tint val="40000"/>
-      </a:schemeClr>
-    </dgm:linClrLst>
-    <dgm:effectClrLst/>
-    <dgm:txLinClrLst/>
-    <dgm:txFillClrLst meth="repeat">
-      <a:schemeClr val="dk1"/>
-    </dgm:txFillClrLst>
-    <dgm:txEffectClrLst/>
-  </dgm:styleLbl>
-  <dgm:styleLbl name="bgAccFollowNode1">
-    <dgm:fillClrLst meth="repeat">
-      <a:schemeClr val="accent1">
-        <a:alpha val="90000"/>
-        <a:tint val="40000"/>
-      </a:schemeClr>
-    </dgm:fillClrLst>
-    <dgm:linClrLst meth="repeat">
-      <a:schemeClr val="accent1">
-        <a:alpha val="90000"/>
-        <a:tint val="40000"/>
-      </a:schemeClr>
-    </dgm:linClrLst>
-    <dgm:effectClrLst/>
-    <dgm:txLinClrLst/>
-    <dgm:txFillClrLst meth="repeat">
-      <a:schemeClr val="dk1"/>
-    </dgm:txFillClrLst>
-    <dgm:txEffectClrLst/>
-  </dgm:styleLbl>
-  <dgm:styleLbl name="fgAcc0">
-    <dgm:fillClrLst meth="repeat">
-      <a:schemeClr val="lt1">
-        <a:alpha val="90000"/>
-      </a:schemeClr>
-    </dgm:fillClrLst>
-    <dgm:linClrLst meth="repeat">
-      <a:schemeClr val="accent1"/>
-    </dgm:linClrLst>
-    <dgm:effectClrLst/>
-    <dgm:txLinClrLst/>
-    <dgm:txFillClrLst meth="repeat">
-      <a:schemeClr val="dk1"/>
-    </dgm:txFillClrLst>
-    <dgm:txEffectClrLst/>
-  </dgm:styleLbl>
-  <dgm:styleLbl name="fgAcc2">
-    <dgm:fillClrLst meth="repeat">
-      <a:schemeClr val="lt1">
-        <a:alpha val="90000"/>
-      </a:schemeClr>
-    </dgm:fillClrLst>
-    <dgm:linClrLst meth="repeat">
-      <a:schemeClr val="accent1"/>
-    </dgm:linClrLst>
-    <dgm:effectClrLst/>
-    <dgm:txLinClrLst/>
-    <dgm:txFillClrLst meth="repeat">
-      <a:schemeClr val="dk1"/>
-    </dgm:txFillClrLst>
-    <dgm:txEffectClrLst/>
-  </dgm:styleLbl>
-  <dgm:styleLbl name="fgAcc3">
-    <dgm:fillClrLst meth="repeat">
-      <a:schemeClr val="lt1">
-        <a:alpha val="90000"/>
-      </a:schemeClr>
-    </dgm:fillClrLst>
-    <dgm:linClrLst meth="repeat">
-      <a:schemeClr val="accent1"/>
-    </dgm:linClrLst>
-    <dgm:effectClrLst/>
-    <dgm:txLinClrLst/>
-    <dgm:txFillClrLst meth="repeat">
-      <a:schemeClr val="dk1"/>
-    </dgm:txFillClrLst>
-    <dgm:txEffectClrLst/>
-  </dgm:styleLbl>
-  <dgm:styleLbl name="fgAcc4">
-    <dgm:fillClrLst meth="repeat">
-      <a:schemeClr val="lt1">
-        <a:alpha val="90000"/>
-      </a:schemeClr>
-    </dgm:fillClrLst>
-    <dgm:linClrLst meth="repeat">
-      <a:schemeClr val="accent1"/>
-    </dgm:linClrLst>
-    <dgm:effectClrLst/>
-    <dgm:txLinClrLst/>
-    <dgm:txFillClrLst meth="repeat">
-      <a:schemeClr val="dk1"/>
-    </dgm:txFillClrLst>
-    <dgm:txEffectClrLst/>
-  </dgm:styleLbl>
-  <dgm:styleLbl name="bgShp">
-    <dgm:fillClrLst meth="repeat">
-      <a:schemeClr val="accent1">
-        <a:tint val="40000"/>
-      </a:schemeClr>
-    </dgm:fillClrLst>
-    <dgm:linClrLst meth="repeat">
-      <a:schemeClr val="accent1"/>
-    </dgm:linClrLst>
-    <dgm:effectClrLst/>
-    <dgm:txLinClrLst/>
-    <dgm:txFillClrLst meth="repeat">
-      <a:schemeClr val="dk1"/>
-    </dgm:txFillClrLst>
-    <dgm:txEffectClrLst/>
-  </dgm:styleLbl>
-  <dgm:styleLbl name="dkBgShp">
-    <dgm:fillClrLst meth="repeat">
-      <a:schemeClr val="accent1">
-        <a:shade val="80000"/>
-      </a:schemeClr>
-    </dgm:fillClrLst>
-    <dgm:linClrLst meth="repeat">
-      <a:schemeClr val="accent1"/>
-    </dgm:linClrLst>
-    <dgm:effectClrLst/>
-    <dgm:txLinClrLst/>
-    <dgm:txFillClrLst meth="repeat">
-      <a:schemeClr val="lt1"/>
-    </dgm:txFillClrLst>
-    <dgm:txEffectClrLst/>
-  </dgm:styleLbl>
-  <dgm:styleLbl name="trBgShp">
-    <dgm:fillClrLst meth="repeat">
-      <a:schemeClr val="accent1">
-        <a:tint val="50000"/>
-        <a:alpha val="40000"/>
-      </a:schemeClr>
-    </dgm:fillClrLst>
-    <dgm:linClrLst meth="repeat">
-      <a:schemeClr val="accent1"/>
-    </dgm:linClrLst>
-    <dgm:effectClrLst/>
-    <dgm:txLinClrLst/>
-    <dgm:txFillClrLst meth="repeat">
-      <a:schemeClr val="lt1"/>
-    </dgm:txFillClrLst>
-    <dgm:txEffectClrLst/>
-  </dgm:styleLbl>
-  <dgm:styleLbl name="fgShp">
-    <dgm:fillClrLst meth="repeat">
-      <a:schemeClr val="accent1">
-        <a:tint val="60000"/>
-      </a:schemeClr>
-    </dgm:fillClrLst>
-    <dgm:linClrLst meth="repeat">
-      <a:schemeClr val="lt1"/>
-    </dgm:linClrLst>
-    <dgm:effectClrLst/>
-    <dgm:txLinClrLst/>
-    <dgm:txFillClrLst meth="repeat">
-      <a:schemeClr val="dk1"/>
-    </dgm:txFillClrLst>
-    <dgm:txEffectClrLst/>
-  </dgm:styleLbl>
-  <dgm:styleLbl name="revTx">
-    <dgm:fillClrLst meth="repeat">
-      <a:schemeClr val="lt1">
-        <a:alpha val="0"/>
-      </a:schemeClr>
-    </dgm:fillClrLst>
-    <dgm:linClrLst meth="repeat">
-      <a:schemeClr val="dk1">
-        <a:alpha val="0"/>
-      </a:schemeClr>
-    </dgm:linClrLst>
-    <dgm:effectClrLst/>
-    <dgm:txLinClrLst/>
-    <dgm:txFillClrLst meth="repeat">
-      <a:schemeClr val="tx1"/>
-    </dgm:txFillClrLst>
-    <dgm:txEffectClrLst/>
-  </dgm:styleLbl>
-</dgm:colorsDef>
-</file>
-
-<file path=ppt/diagrams/data1.xml><?xml version="1.0" encoding="utf-8"?>
-<dgm:dataModel xmlns:dgm="http://schemas.openxmlformats.org/drawingml/2006/diagram" xmlns:a="http://schemas.openxmlformats.org/drawingml/2006/main">
-  <dgm:ptLst>
-    <dgm:pt modelId="{A1D463D4-5E46-4829-A227-70017115CADE}" type="doc">
-      <dgm:prSet loTypeId="urn:microsoft.com/office/officeart/2008/layout/AlternatingHexagons" loCatId="list" qsTypeId="urn:microsoft.com/office/officeart/2005/8/quickstyle/simple1" qsCatId="simple" csTypeId="urn:microsoft.com/office/officeart/2005/8/colors/accent1_2" csCatId="accent1" phldr="1"/>
-      <dgm:spPr/>
-      <dgm:t>
-        <a:bodyPr/>
-        <a:lstStyle/>
-        <a:p>
-          <a:endParaRPr lang="en-US"/>
-        </a:p>
-      </dgm:t>
-    </dgm:pt>
-    <dgm:pt modelId="{89EA5572-A0F5-444B-BD63-B5F7AB835BC9}">
-      <dgm:prSet phldrT="[Text]"/>
-      <dgm:spPr/>
-      <dgm:t>
-        <a:bodyPr/>
-        <a:lstStyle/>
-        <a:p>
-          <a:r>
-            <a:rPr lang="en-US" dirty="0"/>
-            <a:t>Customer</a:t>
-          </a:r>
-        </a:p>
-      </dgm:t>
-    </dgm:pt>
-    <dgm:pt modelId="{5471F148-25B3-4F5C-AF41-23C09335CF2F}" type="parTrans" cxnId="{3BC60860-B576-49D5-B4E7-3CC57C2C2529}">
-      <dgm:prSet/>
-      <dgm:spPr/>
-      <dgm:t>
-        <a:bodyPr/>
-        <a:lstStyle/>
-        <a:p>
-          <a:endParaRPr lang="en-US"/>
-        </a:p>
-      </dgm:t>
-    </dgm:pt>
-    <dgm:pt modelId="{286E2A9F-4279-402E-B825-0E2CBDB29581}" type="sibTrans" cxnId="{3BC60860-B576-49D5-B4E7-3CC57C2C2529}">
-      <dgm:prSet/>
-      <dgm:spPr/>
-      <dgm:t>
-        <a:bodyPr/>
-        <a:lstStyle/>
-        <a:p>
-          <a:endParaRPr lang="en-US"/>
-        </a:p>
-      </dgm:t>
-    </dgm:pt>
-    <dgm:pt modelId="{1CA842EB-9174-4D37-8785-948AAB4DD74F}">
-      <dgm:prSet phldrT="[Text]"/>
-      <dgm:spPr/>
-      <dgm:t>
-        <a:bodyPr/>
-        <a:lstStyle/>
-        <a:p>
-          <a:r>
-            <a:rPr lang="en-US" dirty="0"/>
-            <a:t>Support</a:t>
-          </a:r>
-        </a:p>
-      </dgm:t>
-    </dgm:pt>
-    <dgm:pt modelId="{1F206C72-2FD6-4C96-918D-5A1B6CB74CE7}" type="parTrans" cxnId="{97CBBE1B-1044-4564-AE84-09FB85333D80}">
-      <dgm:prSet/>
-      <dgm:spPr/>
-      <dgm:t>
-        <a:bodyPr/>
-        <a:lstStyle/>
-        <a:p>
-          <a:endParaRPr lang="en-US"/>
-        </a:p>
-      </dgm:t>
-    </dgm:pt>
-    <dgm:pt modelId="{3A80DDBA-5C84-4390-9B80-D8A95B0BD17C}" type="sibTrans" cxnId="{97CBBE1B-1044-4564-AE84-09FB85333D80}">
-      <dgm:prSet/>
-      <dgm:spPr/>
-      <dgm:t>
-        <a:bodyPr/>
-        <a:lstStyle/>
-        <a:p>
-          <a:endParaRPr lang="en-US"/>
-        </a:p>
-      </dgm:t>
-    </dgm:pt>
-    <dgm:pt modelId="{464D8B53-ED74-4471-B212-2EA13CA21A8E}">
-      <dgm:prSet phldrT="[Text]"/>
-      <dgm:spPr/>
-      <dgm:t>
-        <a:bodyPr/>
-        <a:lstStyle/>
-        <a:p>
-          <a:r>
-            <a:rPr lang="en-US" dirty="0"/>
-            <a:t>Development</a:t>
-          </a:r>
-        </a:p>
-      </dgm:t>
-    </dgm:pt>
-    <dgm:pt modelId="{F279CF4F-F4B5-483B-AFCD-7BF5D39E33E0}" type="parTrans" cxnId="{E6A46A25-E9EE-4345-B42C-A126E5FEE3DE}">
-      <dgm:prSet/>
-      <dgm:spPr/>
-      <dgm:t>
-        <a:bodyPr/>
-        <a:lstStyle/>
-        <a:p>
-          <a:endParaRPr lang="en-US"/>
-        </a:p>
-      </dgm:t>
-    </dgm:pt>
-    <dgm:pt modelId="{523CAD5E-A02F-4CF0-8663-733A7ACFDE3A}" type="sibTrans" cxnId="{E6A46A25-E9EE-4345-B42C-A126E5FEE3DE}">
-      <dgm:prSet/>
-      <dgm:spPr/>
-      <dgm:t>
-        <a:bodyPr/>
-        <a:lstStyle/>
-        <a:p>
-          <a:endParaRPr lang="en-US"/>
-        </a:p>
-      </dgm:t>
-    </dgm:pt>
-    <dgm:pt modelId="{E3B35A4D-4E2E-4E89-A262-1D4C33C16E43}">
-      <dgm:prSet phldrT="[Text]"/>
-      <dgm:spPr/>
-      <dgm:t>
-        <a:bodyPr/>
-        <a:lstStyle/>
-        <a:p>
-          <a:r>
-            <a:rPr lang="en-US" dirty="0"/>
-            <a:t>Tool</a:t>
-          </a:r>
-        </a:p>
-      </dgm:t>
-    </dgm:pt>
-    <dgm:pt modelId="{34F720C3-ADFC-4E21-A49E-EBA536B5D991}" type="parTrans" cxnId="{C7FAD216-DA64-4614-BC17-B5D57F2298FF}">
-      <dgm:prSet/>
-      <dgm:spPr/>
-      <dgm:t>
-        <a:bodyPr/>
-        <a:lstStyle/>
-        <a:p>
-          <a:endParaRPr lang="en-US"/>
-        </a:p>
-      </dgm:t>
-    </dgm:pt>
-    <dgm:pt modelId="{D144D247-860B-4521-BB76-C470B067ACB6}" type="sibTrans" cxnId="{C7FAD216-DA64-4614-BC17-B5D57F2298FF}">
-      <dgm:prSet/>
-      <dgm:spPr/>
-      <dgm:t>
-        <a:bodyPr/>
-        <a:lstStyle/>
-        <a:p>
-          <a:endParaRPr lang="en-US"/>
-        </a:p>
-      </dgm:t>
-    </dgm:pt>
-    <dgm:pt modelId="{102CAA2B-F8DD-4DEE-B21E-64CFA4C3FBBE}">
-      <dgm:prSet phldrT="[Text]"/>
-      <dgm:spPr/>
-      <dgm:t>
-        <a:bodyPr/>
-        <a:lstStyle/>
-        <a:p>
-          <a:r>
-            <a:rPr lang="en-US" dirty="0"/>
-            <a:t>Personal</a:t>
-          </a:r>
-        </a:p>
-      </dgm:t>
-    </dgm:pt>
-    <dgm:pt modelId="{86D0021C-4614-4F9B-8EB5-133075B23D3C}" type="parTrans" cxnId="{725AF098-8E9B-4D49-954F-1E453022FE3C}">
-      <dgm:prSet/>
-      <dgm:spPr/>
-      <dgm:t>
-        <a:bodyPr/>
-        <a:lstStyle/>
-        <a:p>
-          <a:endParaRPr lang="en-US"/>
-        </a:p>
-      </dgm:t>
-    </dgm:pt>
-    <dgm:pt modelId="{CE8116B8-C71A-41A6-ACF2-6C29A3854B62}" type="sibTrans" cxnId="{725AF098-8E9B-4D49-954F-1E453022FE3C}">
-      <dgm:prSet/>
-      <dgm:spPr/>
-      <dgm:t>
-        <a:bodyPr/>
-        <a:lstStyle/>
-        <a:p>
-          <a:endParaRPr lang="en-US"/>
-        </a:p>
-      </dgm:t>
-    </dgm:pt>
-    <dgm:pt modelId="{C4DD50B8-37F2-4310-ABC2-A55EC2BE15E4}">
-      <dgm:prSet phldrT="[Text]"/>
-      <dgm:spPr/>
-      <dgm:t>
-        <a:bodyPr/>
-        <a:lstStyle/>
-        <a:p>
-          <a:r>
-            <a:rPr lang="en-US" dirty="0"/>
-            <a:t>Details</a:t>
-          </a:r>
-        </a:p>
-      </dgm:t>
-    </dgm:pt>
-    <dgm:pt modelId="{6892B8D1-D25E-4A97-AD4D-BACF9CC7EF18}" type="parTrans" cxnId="{4F4FE043-C61B-4183-B1B9-F1D327C45DF3}">
-      <dgm:prSet/>
-      <dgm:spPr/>
-      <dgm:t>
-        <a:bodyPr/>
-        <a:lstStyle/>
-        <a:p>
-          <a:endParaRPr lang="en-US"/>
-        </a:p>
-      </dgm:t>
-    </dgm:pt>
-    <dgm:pt modelId="{0412EF5C-B357-4B38-A6B1-0BAD47F9DA85}" type="sibTrans" cxnId="{4F4FE043-C61B-4183-B1B9-F1D327C45DF3}">
-      <dgm:prSet/>
-      <dgm:spPr/>
-      <dgm:t>
-        <a:bodyPr/>
-        <a:lstStyle/>
-        <a:p>
-          <a:endParaRPr lang="en-US"/>
-        </a:p>
-      </dgm:t>
-    </dgm:pt>
-    <dgm:pt modelId="{CD8E44A3-A113-4981-9FC3-07596B07B32B}" type="pres">
-      <dgm:prSet presAssocID="{A1D463D4-5E46-4829-A227-70017115CADE}" presName="Name0" presStyleCnt="0">
-        <dgm:presLayoutVars>
-          <dgm:chMax/>
-          <dgm:chPref/>
-          <dgm:dir/>
-          <dgm:animLvl val="lvl"/>
-        </dgm:presLayoutVars>
-      </dgm:prSet>
-      <dgm:spPr/>
-    </dgm:pt>
-    <dgm:pt modelId="{94AE7D6E-16C7-42B9-97DC-61F44F0EB43D}" type="pres">
-      <dgm:prSet presAssocID="{89EA5572-A0F5-444B-BD63-B5F7AB835BC9}" presName="composite" presStyleCnt="0"/>
-      <dgm:spPr/>
-    </dgm:pt>
-    <dgm:pt modelId="{EB8B37C4-FC30-4004-AA7D-2FDF5B5F0A10}" type="pres">
-      <dgm:prSet presAssocID="{89EA5572-A0F5-444B-BD63-B5F7AB835BC9}" presName="Parent1" presStyleLbl="node1" presStyleIdx="0" presStyleCnt="6">
-        <dgm:presLayoutVars>
-          <dgm:chMax val="1"/>
-          <dgm:chPref val="1"/>
-          <dgm:bulletEnabled val="1"/>
-        </dgm:presLayoutVars>
-      </dgm:prSet>
-      <dgm:spPr/>
-    </dgm:pt>
-    <dgm:pt modelId="{8A13994F-D49A-4158-8D3F-F78FA83D3B97}" type="pres">
-      <dgm:prSet presAssocID="{89EA5572-A0F5-444B-BD63-B5F7AB835BC9}" presName="Childtext1" presStyleLbl="revTx" presStyleIdx="0" presStyleCnt="3">
-        <dgm:presLayoutVars>
-          <dgm:chMax val="0"/>
-          <dgm:chPref val="0"/>
-          <dgm:bulletEnabled val="1"/>
-        </dgm:presLayoutVars>
-      </dgm:prSet>
-      <dgm:spPr/>
-    </dgm:pt>
-    <dgm:pt modelId="{820A145D-DC3E-4922-840F-A980720E2C25}" type="pres">
-      <dgm:prSet presAssocID="{89EA5572-A0F5-444B-BD63-B5F7AB835BC9}" presName="BalanceSpacing" presStyleCnt="0"/>
-      <dgm:spPr/>
-    </dgm:pt>
-    <dgm:pt modelId="{6B73610D-CE06-4D28-BAB5-DED86B3CB33E}" type="pres">
-      <dgm:prSet presAssocID="{89EA5572-A0F5-444B-BD63-B5F7AB835BC9}" presName="BalanceSpacing1" presStyleCnt="0"/>
-      <dgm:spPr/>
-    </dgm:pt>
-    <dgm:pt modelId="{A3A45FDC-0BA9-48D0-87E7-D12AAD33ADE6}" type="pres">
-      <dgm:prSet presAssocID="{286E2A9F-4279-402E-B825-0E2CBDB29581}" presName="Accent1Text" presStyleLbl="node1" presStyleIdx="1" presStyleCnt="6"/>
-      <dgm:spPr/>
-    </dgm:pt>
-    <dgm:pt modelId="{1B036340-017A-460E-91D7-63ABC92CCEE7}" type="pres">
-      <dgm:prSet presAssocID="{286E2A9F-4279-402E-B825-0E2CBDB29581}" presName="spaceBetweenRectangles" presStyleCnt="0"/>
-      <dgm:spPr/>
-    </dgm:pt>
-    <dgm:pt modelId="{361D960F-33D0-4EEE-AFF6-B5CF2D3E4B09}" type="pres">
-      <dgm:prSet presAssocID="{464D8B53-ED74-4471-B212-2EA13CA21A8E}" presName="composite" presStyleCnt="0"/>
-      <dgm:spPr/>
-    </dgm:pt>
-    <dgm:pt modelId="{60D81187-E020-487E-AAB7-B5729DF5DAED}" type="pres">
-      <dgm:prSet presAssocID="{464D8B53-ED74-4471-B212-2EA13CA21A8E}" presName="Parent1" presStyleLbl="node1" presStyleIdx="2" presStyleCnt="6">
-        <dgm:presLayoutVars>
-          <dgm:chMax val="1"/>
-          <dgm:chPref val="1"/>
-          <dgm:bulletEnabled val="1"/>
-        </dgm:presLayoutVars>
-      </dgm:prSet>
-      <dgm:spPr/>
-    </dgm:pt>
-    <dgm:pt modelId="{8F15F0E2-A739-4E0F-9728-ADA4AA103421}" type="pres">
-      <dgm:prSet presAssocID="{464D8B53-ED74-4471-B212-2EA13CA21A8E}" presName="Childtext1" presStyleLbl="revTx" presStyleIdx="1" presStyleCnt="3">
-        <dgm:presLayoutVars>
-          <dgm:chMax val="0"/>
-          <dgm:chPref val="0"/>
-          <dgm:bulletEnabled val="1"/>
-        </dgm:presLayoutVars>
-      </dgm:prSet>
-      <dgm:spPr/>
-    </dgm:pt>
-    <dgm:pt modelId="{9147257B-B5E4-4A37-AA6D-38B6A3253512}" type="pres">
-      <dgm:prSet presAssocID="{464D8B53-ED74-4471-B212-2EA13CA21A8E}" presName="BalanceSpacing" presStyleCnt="0"/>
-      <dgm:spPr/>
-    </dgm:pt>
-    <dgm:pt modelId="{66DC2105-96B6-4EC6-856E-3381DC793605}" type="pres">
-      <dgm:prSet presAssocID="{464D8B53-ED74-4471-B212-2EA13CA21A8E}" presName="BalanceSpacing1" presStyleCnt="0"/>
-      <dgm:spPr/>
-    </dgm:pt>
-    <dgm:pt modelId="{3CB1DD77-A7DA-4C8B-8801-2BF5D7AF0DEB}" type="pres">
-      <dgm:prSet presAssocID="{523CAD5E-A02F-4CF0-8663-733A7ACFDE3A}" presName="Accent1Text" presStyleLbl="node1" presStyleIdx="3" presStyleCnt="6"/>
-      <dgm:spPr/>
-    </dgm:pt>
-    <dgm:pt modelId="{DBF2D4CA-3D0E-4640-874E-267348BE4DCD}" type="pres">
-      <dgm:prSet presAssocID="{523CAD5E-A02F-4CF0-8663-733A7ACFDE3A}" presName="spaceBetweenRectangles" presStyleCnt="0"/>
-      <dgm:spPr/>
-    </dgm:pt>
-    <dgm:pt modelId="{BF5C1752-51A8-458D-9003-4BC261A85EB4}" type="pres">
-      <dgm:prSet presAssocID="{102CAA2B-F8DD-4DEE-B21E-64CFA4C3FBBE}" presName="composite" presStyleCnt="0"/>
-      <dgm:spPr/>
-    </dgm:pt>
-    <dgm:pt modelId="{E15322BA-E40D-4BA8-A1EB-CAC67AC64C03}" type="pres">
-      <dgm:prSet presAssocID="{102CAA2B-F8DD-4DEE-B21E-64CFA4C3FBBE}" presName="Parent1" presStyleLbl="node1" presStyleIdx="4" presStyleCnt="6">
-        <dgm:presLayoutVars>
-          <dgm:chMax val="1"/>
-          <dgm:chPref val="1"/>
-          <dgm:bulletEnabled val="1"/>
-        </dgm:presLayoutVars>
-      </dgm:prSet>
-      <dgm:spPr/>
-    </dgm:pt>
-    <dgm:pt modelId="{1C776C71-E52D-4672-A82E-2D1E4CB80C50}" type="pres">
-      <dgm:prSet presAssocID="{102CAA2B-F8DD-4DEE-B21E-64CFA4C3FBBE}" presName="Childtext1" presStyleLbl="revTx" presStyleIdx="2" presStyleCnt="3">
-        <dgm:presLayoutVars>
-          <dgm:chMax val="0"/>
-          <dgm:chPref val="0"/>
-          <dgm:bulletEnabled val="1"/>
-        </dgm:presLayoutVars>
-      </dgm:prSet>
-      <dgm:spPr/>
-    </dgm:pt>
-    <dgm:pt modelId="{0644EFE1-A0B7-4A03-A53C-120AD636809C}" type="pres">
-      <dgm:prSet presAssocID="{102CAA2B-F8DD-4DEE-B21E-64CFA4C3FBBE}" presName="BalanceSpacing" presStyleCnt="0"/>
-      <dgm:spPr/>
-    </dgm:pt>
-    <dgm:pt modelId="{019F3849-743F-4C2B-BB0E-5E641C27ECFF}" type="pres">
-      <dgm:prSet presAssocID="{102CAA2B-F8DD-4DEE-B21E-64CFA4C3FBBE}" presName="BalanceSpacing1" presStyleCnt="0"/>
-      <dgm:spPr/>
-    </dgm:pt>
-    <dgm:pt modelId="{6283C350-90C8-4407-8F54-02837F9F89ED}" type="pres">
-      <dgm:prSet presAssocID="{CE8116B8-C71A-41A6-ACF2-6C29A3854B62}" presName="Accent1Text" presStyleLbl="node1" presStyleIdx="5" presStyleCnt="6"/>
-      <dgm:spPr/>
-    </dgm:pt>
-  </dgm:ptLst>
-  <dgm:cxnLst>
-    <dgm:cxn modelId="{E353010B-7C1E-4E23-B29D-B9F282E61E1A}" type="presOf" srcId="{E3B35A4D-4E2E-4E89-A262-1D4C33C16E43}" destId="{8F15F0E2-A739-4E0F-9728-ADA4AA103421}" srcOrd="0" destOrd="0" presId="urn:microsoft.com/office/officeart/2008/layout/AlternatingHexagons"/>
-    <dgm:cxn modelId="{C7FAD216-DA64-4614-BC17-B5D57F2298FF}" srcId="{464D8B53-ED74-4471-B212-2EA13CA21A8E}" destId="{E3B35A4D-4E2E-4E89-A262-1D4C33C16E43}" srcOrd="0" destOrd="0" parTransId="{34F720C3-ADFC-4E21-A49E-EBA536B5D991}" sibTransId="{D144D247-860B-4521-BB76-C470B067ACB6}"/>
-    <dgm:cxn modelId="{97CBBE1B-1044-4564-AE84-09FB85333D80}" srcId="{89EA5572-A0F5-444B-BD63-B5F7AB835BC9}" destId="{1CA842EB-9174-4D37-8785-948AAB4DD74F}" srcOrd="0" destOrd="0" parTransId="{1F206C72-2FD6-4C96-918D-5A1B6CB74CE7}" sibTransId="{3A80DDBA-5C84-4390-9B80-D8A95B0BD17C}"/>
-    <dgm:cxn modelId="{5C3B5A1F-1CEB-426E-B667-F8FDD7941888}" type="presOf" srcId="{A1D463D4-5E46-4829-A227-70017115CADE}" destId="{CD8E44A3-A113-4981-9FC3-07596B07B32B}" srcOrd="0" destOrd="0" presId="urn:microsoft.com/office/officeart/2008/layout/AlternatingHexagons"/>
-    <dgm:cxn modelId="{E6A46A25-E9EE-4345-B42C-A126E5FEE3DE}" srcId="{A1D463D4-5E46-4829-A227-70017115CADE}" destId="{464D8B53-ED74-4471-B212-2EA13CA21A8E}" srcOrd="1" destOrd="0" parTransId="{F279CF4F-F4B5-483B-AFCD-7BF5D39E33E0}" sibTransId="{523CAD5E-A02F-4CF0-8663-733A7ACFDE3A}"/>
-    <dgm:cxn modelId="{CF8B5C3A-259D-4412-995C-7BA35B082FB9}" type="presOf" srcId="{89EA5572-A0F5-444B-BD63-B5F7AB835BC9}" destId="{EB8B37C4-FC30-4004-AA7D-2FDF5B5F0A10}" srcOrd="0" destOrd="0" presId="urn:microsoft.com/office/officeart/2008/layout/AlternatingHexagons"/>
-    <dgm:cxn modelId="{3BC60860-B576-49D5-B4E7-3CC57C2C2529}" srcId="{A1D463D4-5E46-4829-A227-70017115CADE}" destId="{89EA5572-A0F5-444B-BD63-B5F7AB835BC9}" srcOrd="0" destOrd="0" parTransId="{5471F148-25B3-4F5C-AF41-23C09335CF2F}" sibTransId="{286E2A9F-4279-402E-B825-0E2CBDB29581}"/>
-    <dgm:cxn modelId="{4F4FE043-C61B-4183-B1B9-F1D327C45DF3}" srcId="{102CAA2B-F8DD-4DEE-B21E-64CFA4C3FBBE}" destId="{C4DD50B8-37F2-4310-ABC2-A55EC2BE15E4}" srcOrd="0" destOrd="0" parTransId="{6892B8D1-D25E-4A97-AD4D-BACF9CC7EF18}" sibTransId="{0412EF5C-B357-4B38-A6B1-0BAD47F9DA85}"/>
-    <dgm:cxn modelId="{997A5F45-7A1B-4494-984E-F5826E8936DC}" type="presOf" srcId="{1CA842EB-9174-4D37-8785-948AAB4DD74F}" destId="{8A13994F-D49A-4158-8D3F-F78FA83D3B97}" srcOrd="0" destOrd="0" presId="urn:microsoft.com/office/officeart/2008/layout/AlternatingHexagons"/>
-    <dgm:cxn modelId="{39B83867-C4BB-4682-9C75-7A29FE6D8D64}" type="presOf" srcId="{523CAD5E-A02F-4CF0-8663-733A7ACFDE3A}" destId="{3CB1DD77-A7DA-4C8B-8801-2BF5D7AF0DEB}" srcOrd="0" destOrd="0" presId="urn:microsoft.com/office/officeart/2008/layout/AlternatingHexagons"/>
-    <dgm:cxn modelId="{C0263F70-ECB6-4CBD-A59F-4FD59FB5E740}" type="presOf" srcId="{286E2A9F-4279-402E-B825-0E2CBDB29581}" destId="{A3A45FDC-0BA9-48D0-87E7-D12AAD33ADE6}" srcOrd="0" destOrd="0" presId="urn:microsoft.com/office/officeart/2008/layout/AlternatingHexagons"/>
-    <dgm:cxn modelId="{DC71DD7E-1678-43E1-99A2-EFE81B316F24}" type="presOf" srcId="{102CAA2B-F8DD-4DEE-B21E-64CFA4C3FBBE}" destId="{E15322BA-E40D-4BA8-A1EB-CAC67AC64C03}" srcOrd="0" destOrd="0" presId="urn:microsoft.com/office/officeart/2008/layout/AlternatingHexagons"/>
-    <dgm:cxn modelId="{725AF098-8E9B-4D49-954F-1E453022FE3C}" srcId="{A1D463D4-5E46-4829-A227-70017115CADE}" destId="{102CAA2B-F8DD-4DEE-B21E-64CFA4C3FBBE}" srcOrd="2" destOrd="0" parTransId="{86D0021C-4614-4F9B-8EB5-133075B23D3C}" sibTransId="{CE8116B8-C71A-41A6-ACF2-6C29A3854B62}"/>
-    <dgm:cxn modelId="{85C054B9-ABB1-4FD7-89BB-7A490D567E00}" type="presOf" srcId="{CE8116B8-C71A-41A6-ACF2-6C29A3854B62}" destId="{6283C350-90C8-4407-8F54-02837F9F89ED}" srcOrd="0" destOrd="0" presId="urn:microsoft.com/office/officeart/2008/layout/AlternatingHexagons"/>
-    <dgm:cxn modelId="{32E48CBC-0AC2-4B7A-8957-690D6B9FE700}" type="presOf" srcId="{C4DD50B8-37F2-4310-ABC2-A55EC2BE15E4}" destId="{1C776C71-E52D-4672-A82E-2D1E4CB80C50}" srcOrd="0" destOrd="0" presId="urn:microsoft.com/office/officeart/2008/layout/AlternatingHexagons"/>
-    <dgm:cxn modelId="{637A14E8-AAF9-4DCE-BF86-04EDF7C06363}" type="presOf" srcId="{464D8B53-ED74-4471-B212-2EA13CA21A8E}" destId="{60D81187-E020-487E-AAB7-B5729DF5DAED}" srcOrd="0" destOrd="0" presId="urn:microsoft.com/office/officeart/2008/layout/AlternatingHexagons"/>
-    <dgm:cxn modelId="{BC980FFE-94B5-4AA8-B5EB-40EC9D4E15BA}" type="presParOf" srcId="{CD8E44A3-A113-4981-9FC3-07596B07B32B}" destId="{94AE7D6E-16C7-42B9-97DC-61F44F0EB43D}" srcOrd="0" destOrd="0" presId="urn:microsoft.com/office/officeart/2008/layout/AlternatingHexagons"/>
-    <dgm:cxn modelId="{80148217-4227-4799-B67B-4DB1F565E9B0}" type="presParOf" srcId="{94AE7D6E-16C7-42B9-97DC-61F44F0EB43D}" destId="{EB8B37C4-FC30-4004-AA7D-2FDF5B5F0A10}" srcOrd="0" destOrd="0" presId="urn:microsoft.com/office/officeart/2008/layout/AlternatingHexagons"/>
-    <dgm:cxn modelId="{023A6F92-BF7A-45DC-B708-533B11DA7DA1}" type="presParOf" srcId="{94AE7D6E-16C7-42B9-97DC-61F44F0EB43D}" destId="{8A13994F-D49A-4158-8D3F-F78FA83D3B97}" srcOrd="1" destOrd="0" presId="urn:microsoft.com/office/officeart/2008/layout/AlternatingHexagons"/>
-    <dgm:cxn modelId="{C591058D-F492-4E29-91C1-414D702EC6D9}" type="presParOf" srcId="{94AE7D6E-16C7-42B9-97DC-61F44F0EB43D}" destId="{820A145D-DC3E-4922-840F-A980720E2C25}" srcOrd="2" destOrd="0" presId="urn:microsoft.com/office/officeart/2008/layout/AlternatingHexagons"/>
-    <dgm:cxn modelId="{CC52C966-DF61-4A10-A059-EAFD2EFE1C6D}" type="presParOf" srcId="{94AE7D6E-16C7-42B9-97DC-61F44F0EB43D}" destId="{6B73610D-CE06-4D28-BAB5-DED86B3CB33E}" srcOrd="3" destOrd="0" presId="urn:microsoft.com/office/officeart/2008/layout/AlternatingHexagons"/>
-    <dgm:cxn modelId="{797D2A5C-BE5C-45B2-9414-464E2A4745EE}" type="presParOf" srcId="{94AE7D6E-16C7-42B9-97DC-61F44F0EB43D}" destId="{A3A45FDC-0BA9-48D0-87E7-D12AAD33ADE6}" srcOrd="4" destOrd="0" presId="urn:microsoft.com/office/officeart/2008/layout/AlternatingHexagons"/>
-    <dgm:cxn modelId="{A29EE1C1-4B2A-421F-90D1-DEFBD281D253}" type="presParOf" srcId="{CD8E44A3-A113-4981-9FC3-07596B07B32B}" destId="{1B036340-017A-460E-91D7-63ABC92CCEE7}" srcOrd="1" destOrd="0" presId="urn:microsoft.com/office/officeart/2008/layout/AlternatingHexagons"/>
-    <dgm:cxn modelId="{B9A1CA80-1BAD-43FF-AC06-5D67A50F73C4}" type="presParOf" srcId="{CD8E44A3-A113-4981-9FC3-07596B07B32B}" destId="{361D960F-33D0-4EEE-AFF6-B5CF2D3E4B09}" srcOrd="2" destOrd="0" presId="urn:microsoft.com/office/officeart/2008/layout/AlternatingHexagons"/>
-    <dgm:cxn modelId="{28867759-3A58-48B0-B633-C65A20D9D259}" type="presParOf" srcId="{361D960F-33D0-4EEE-AFF6-B5CF2D3E4B09}" destId="{60D81187-E020-487E-AAB7-B5729DF5DAED}" srcOrd="0" destOrd="0" presId="urn:microsoft.com/office/officeart/2008/layout/AlternatingHexagons"/>
-    <dgm:cxn modelId="{D3521582-1622-410C-8955-88337EABCB6A}" type="presParOf" srcId="{361D960F-33D0-4EEE-AFF6-B5CF2D3E4B09}" destId="{8F15F0E2-A739-4E0F-9728-ADA4AA103421}" srcOrd="1" destOrd="0" presId="urn:microsoft.com/office/officeart/2008/layout/AlternatingHexagons"/>
-    <dgm:cxn modelId="{8B7A72E0-82E9-46AB-BA8B-0A1A89D0F60B}" type="presParOf" srcId="{361D960F-33D0-4EEE-AFF6-B5CF2D3E4B09}" destId="{9147257B-B5E4-4A37-AA6D-38B6A3253512}" srcOrd="2" destOrd="0" presId="urn:microsoft.com/office/officeart/2008/layout/AlternatingHexagons"/>
-    <dgm:cxn modelId="{9926103B-8860-4AFD-BF3F-9ACF5AF2B116}" type="presParOf" srcId="{361D960F-33D0-4EEE-AFF6-B5CF2D3E4B09}" destId="{66DC2105-96B6-4EC6-856E-3381DC793605}" srcOrd="3" destOrd="0" presId="urn:microsoft.com/office/officeart/2008/layout/AlternatingHexagons"/>
-    <dgm:cxn modelId="{9EDE5089-E6A0-471D-BAE2-00C3E1FC6801}" type="presParOf" srcId="{361D960F-33D0-4EEE-AFF6-B5CF2D3E4B09}" destId="{3CB1DD77-A7DA-4C8B-8801-2BF5D7AF0DEB}" srcOrd="4" destOrd="0" presId="urn:microsoft.com/office/officeart/2008/layout/AlternatingHexagons"/>
-    <dgm:cxn modelId="{13B1BB55-749D-4EC4-A378-5384548EF3EF}" type="presParOf" srcId="{CD8E44A3-A113-4981-9FC3-07596B07B32B}" destId="{DBF2D4CA-3D0E-4640-874E-267348BE4DCD}" srcOrd="3" destOrd="0" presId="urn:microsoft.com/office/officeart/2008/layout/AlternatingHexagons"/>
-    <dgm:cxn modelId="{2749C83C-C8A2-43B2-8B30-EEF3046D5A7E}" type="presParOf" srcId="{CD8E44A3-A113-4981-9FC3-07596B07B32B}" destId="{BF5C1752-51A8-458D-9003-4BC261A85EB4}" srcOrd="4" destOrd="0" presId="urn:microsoft.com/office/officeart/2008/layout/AlternatingHexagons"/>
-    <dgm:cxn modelId="{E089A7CA-A5A3-45D6-B9ED-AF4C2A90BAAE}" type="presParOf" srcId="{BF5C1752-51A8-458D-9003-4BC261A85EB4}" destId="{E15322BA-E40D-4BA8-A1EB-CAC67AC64C03}" srcOrd="0" destOrd="0" presId="urn:microsoft.com/office/officeart/2008/layout/AlternatingHexagons"/>
-    <dgm:cxn modelId="{14252461-2829-4759-952E-E7FBE9D48C2E}" type="presParOf" srcId="{BF5C1752-51A8-458D-9003-4BC261A85EB4}" destId="{1C776C71-E52D-4672-A82E-2D1E4CB80C50}" srcOrd="1" destOrd="0" presId="urn:microsoft.com/office/officeart/2008/layout/AlternatingHexagons"/>
-    <dgm:cxn modelId="{D3A153F0-B40E-4A86-9DBC-B7CD549517F7}" type="presParOf" srcId="{BF5C1752-51A8-458D-9003-4BC261A85EB4}" destId="{0644EFE1-A0B7-4A03-A53C-120AD636809C}" srcOrd="2" destOrd="0" presId="urn:microsoft.com/office/officeart/2008/layout/AlternatingHexagons"/>
-    <dgm:cxn modelId="{2E98C4A6-25B8-4F60-9E85-24F219FD625D}" type="presParOf" srcId="{BF5C1752-51A8-458D-9003-4BC261A85EB4}" destId="{019F3849-743F-4C2B-BB0E-5E641C27ECFF}" srcOrd="3" destOrd="0" presId="urn:microsoft.com/office/officeart/2008/layout/AlternatingHexagons"/>
-    <dgm:cxn modelId="{B8BDD112-5965-4B1D-A32D-C7E235CAA347}" type="presParOf" srcId="{BF5C1752-51A8-458D-9003-4BC261A85EB4}" destId="{6283C350-90C8-4407-8F54-02837F9F89ED}" srcOrd="4" destOrd="0" presId="urn:microsoft.com/office/officeart/2008/layout/AlternatingHexagons"/>
-  </dgm:cxnLst>
-  <dgm:bg/>
-  <dgm:whole/>
-  <dgm:extLst>
-    <a:ext uri="http://schemas.microsoft.com/office/drawing/2008/diagram">
-      <dsp:dataModelExt xmlns:dsp="http://schemas.microsoft.com/office/drawing/2008/diagram" relId="rId7" minVer="http://schemas.openxmlformats.org/drawingml/2006/diagram"/>
-    </a:ext>
-  </dgm:extLst>
-</dgm:dataModel>
-</file>
-
-<file path=ppt/diagrams/drawing1.xml><?xml version="1.0" encoding="utf-8"?>
-<dsp:drawing xmlns:dgm="http://schemas.openxmlformats.org/drawingml/2006/diagram" xmlns:dsp="http://schemas.microsoft.com/office/drawing/2008/diagram" xmlns:a="http://schemas.openxmlformats.org/drawingml/2006/main">
-  <dsp:spTree>
-    <dsp:nvGrpSpPr>
-      <dsp:cNvPr id="0" name=""/>
-      <dsp:cNvGrpSpPr/>
-    </dsp:nvGrpSpPr>
-    <dsp:grpSpPr/>
-    <dsp:sp modelId="{EB8B37C4-FC30-4004-AA7D-2FDF5B5F0A10}">
-      <dsp:nvSpPr>
-        <dsp:cNvPr id="0" name=""/>
-        <dsp:cNvSpPr/>
-      </dsp:nvSpPr>
-      <dsp:spPr>
-        <a:xfrm rot="5400000">
-          <a:off x="3506806" y="130656"/>
-          <a:ext cx="2008628" cy="1747506"/>
-        </a:xfrm>
-        <a:prstGeom prst="hexagon">
-          <a:avLst>
-            <a:gd name="adj" fmla="val 25000"/>
-            <a:gd name="vf" fmla="val 115470"/>
-          </a:avLst>
-        </a:prstGeom>
-        <a:solidFill>
-          <a:schemeClr val="accent1">
-            <a:hueOff val="0"/>
-            <a:satOff val="0"/>
-            <a:lumOff val="0"/>
-            <a:alphaOff val="0"/>
-          </a:schemeClr>
-        </a:solidFill>
-        <a:ln w="12700" cap="flat" cmpd="sng" algn="ctr">
-          <a:solidFill>
-            <a:schemeClr val="lt1">
-              <a:hueOff val="0"/>
-              <a:satOff val="0"/>
-              <a:lumOff val="0"/>
-              <a:alphaOff val="0"/>
-            </a:schemeClr>
-          </a:solidFill>
-          <a:prstDash val="solid"/>
-          <a:miter lim="800000"/>
-        </a:ln>
-        <a:effectLst/>
-      </dsp:spPr>
-      <dsp:style>
-        <a:lnRef idx="2">
-          <a:scrgbClr r="0" g="0" b="0"/>
-        </a:lnRef>
-        <a:fillRef idx="1">
-          <a:scrgbClr r="0" g="0" b="0"/>
-        </a:fillRef>
-        <a:effectRef idx="0">
-          <a:scrgbClr r="0" g="0" b="0"/>
-        </a:effectRef>
-        <a:fontRef idx="minor">
-          <a:schemeClr val="lt1"/>
-        </a:fontRef>
-      </dsp:style>
-      <dsp:txBody>
-        <a:bodyPr spcFirstLastPara="0" vert="horz" wrap="square" lIns="57150" tIns="57150" rIns="57150" bIns="57150" numCol="1" spcCol="1270" anchor="ctr" anchorCtr="0">
-          <a:noAutofit/>
-        </a:bodyPr>
-        <a:lstStyle/>
-        <a:p>
-          <a:pPr marL="0" lvl="0" indent="0" algn="ctr" defTabSz="666750">
-            <a:lnSpc>
-              <a:spcPct val="90000"/>
-            </a:lnSpc>
-            <a:spcBef>
-              <a:spcPct val="0"/>
-            </a:spcBef>
-            <a:spcAft>
-              <a:spcPct val="35000"/>
-            </a:spcAft>
-            <a:buNone/>
-          </a:pPr>
-          <a:r>
-            <a:rPr lang="en-US" sz="1500" kern="1200" dirty="0"/>
-            <a:t>Customer</a:t>
-          </a:r>
-        </a:p>
-      </dsp:txBody>
-      <dsp:txXfrm rot="-5400000">
-        <a:off x="3909687" y="313106"/>
-        <a:ext cx="1202866" cy="1382606"/>
-      </dsp:txXfrm>
-    </dsp:sp>
-    <dsp:sp modelId="{8A13994F-D49A-4158-8D3F-F78FA83D3B97}">
-      <dsp:nvSpPr>
-        <dsp:cNvPr id="0" name=""/>
-        <dsp:cNvSpPr/>
-      </dsp:nvSpPr>
-      <dsp:spPr>
-        <a:xfrm>
-          <a:off x="5437901" y="401821"/>
-          <a:ext cx="2241629" cy="1205177"/>
-        </a:xfrm>
-        <a:prstGeom prst="rect">
-          <a:avLst/>
-        </a:prstGeom>
-        <a:noFill/>
-        <a:ln>
-          <a:noFill/>
-        </a:ln>
-        <a:effectLst/>
-      </dsp:spPr>
-      <dsp:style>
-        <a:lnRef idx="0">
-          <a:scrgbClr r="0" g="0" b="0"/>
-        </a:lnRef>
-        <a:fillRef idx="0">
-          <a:scrgbClr r="0" g="0" b="0"/>
-        </a:fillRef>
-        <a:effectRef idx="0">
-          <a:scrgbClr r="0" g="0" b="0"/>
-        </a:effectRef>
-        <a:fontRef idx="minor"/>
-      </dsp:style>
-      <dsp:txBody>
-        <a:bodyPr spcFirstLastPara="0" vert="horz" wrap="square" lIns="57150" tIns="57150" rIns="57150" bIns="57150" numCol="1" spcCol="1270" anchor="ctr" anchorCtr="0">
-          <a:noAutofit/>
-        </a:bodyPr>
-        <a:lstStyle/>
-        <a:p>
-          <a:pPr marL="0" lvl="0" indent="0" algn="l" defTabSz="666750">
-            <a:lnSpc>
-              <a:spcPct val="90000"/>
-            </a:lnSpc>
-            <a:spcBef>
-              <a:spcPct val="0"/>
-            </a:spcBef>
-            <a:spcAft>
-              <a:spcPct val="35000"/>
-            </a:spcAft>
-            <a:buNone/>
-          </a:pPr>
-          <a:r>
-            <a:rPr lang="en-US" sz="1500" kern="1200" dirty="0"/>
-            <a:t>Support</a:t>
-          </a:r>
-        </a:p>
-      </dsp:txBody>
-      <dsp:txXfrm>
-        <a:off x="5437901" y="401821"/>
-        <a:ext cx="2241629" cy="1205177"/>
-      </dsp:txXfrm>
-    </dsp:sp>
-    <dsp:sp modelId="{A3A45FDC-0BA9-48D0-87E7-D12AAD33ADE6}">
-      <dsp:nvSpPr>
-        <dsp:cNvPr id="0" name=""/>
-        <dsp:cNvSpPr/>
-      </dsp:nvSpPr>
-      <dsp:spPr>
-        <a:xfrm rot="5400000">
-          <a:off x="1619499" y="130656"/>
-          <a:ext cx="2008628" cy="1747506"/>
-        </a:xfrm>
-        <a:prstGeom prst="hexagon">
-          <a:avLst>
-            <a:gd name="adj" fmla="val 25000"/>
-            <a:gd name="vf" fmla="val 115470"/>
-          </a:avLst>
-        </a:prstGeom>
-        <a:solidFill>
-          <a:schemeClr val="accent1">
-            <a:hueOff val="0"/>
-            <a:satOff val="0"/>
-            <a:lumOff val="0"/>
-            <a:alphaOff val="0"/>
-          </a:schemeClr>
-        </a:solidFill>
-        <a:ln w="12700" cap="flat" cmpd="sng" algn="ctr">
-          <a:solidFill>
-            <a:schemeClr val="lt1">
-              <a:hueOff val="0"/>
-              <a:satOff val="0"/>
-              <a:lumOff val="0"/>
-              <a:alphaOff val="0"/>
-            </a:schemeClr>
-          </a:solidFill>
-          <a:prstDash val="solid"/>
-          <a:miter lim="800000"/>
-        </a:ln>
-        <a:effectLst/>
-      </dsp:spPr>
-      <dsp:style>
-        <a:lnRef idx="2">
-          <a:scrgbClr r="0" g="0" b="0"/>
-        </a:lnRef>
-        <a:fillRef idx="1">
-          <a:scrgbClr r="0" g="0" b="0"/>
-        </a:fillRef>
-        <a:effectRef idx="0">
-          <a:scrgbClr r="0" g="0" b="0"/>
-        </a:effectRef>
-        <a:fontRef idx="minor">
-          <a:schemeClr val="lt1"/>
-        </a:fontRef>
-      </dsp:style>
-      <dsp:txBody>
-        <a:bodyPr spcFirstLastPara="0" vert="horz" wrap="square" lIns="0" tIns="0" rIns="0" bIns="0" numCol="1" spcCol="1270" anchor="ctr" anchorCtr="0">
-          <a:noAutofit/>
-        </a:bodyPr>
-        <a:lstStyle/>
-        <a:p>
-          <a:pPr marL="0" lvl="0" indent="0" algn="ctr" defTabSz="1600200">
-            <a:lnSpc>
-              <a:spcPct val="90000"/>
-            </a:lnSpc>
-            <a:spcBef>
-              <a:spcPct val="0"/>
-            </a:spcBef>
-            <a:spcAft>
-              <a:spcPct val="35000"/>
-            </a:spcAft>
-            <a:buNone/>
-          </a:pPr>
-          <a:endParaRPr lang="en-US" sz="3600" kern="1200"/>
-        </a:p>
-      </dsp:txBody>
-      <dsp:txXfrm rot="-5400000">
-        <a:off x="2022380" y="313106"/>
-        <a:ext cx="1202866" cy="1382606"/>
-      </dsp:txXfrm>
-    </dsp:sp>
-    <dsp:sp modelId="{60D81187-E020-487E-AAB7-B5729DF5DAED}">
-      <dsp:nvSpPr>
-        <dsp:cNvPr id="0" name=""/>
-        <dsp:cNvSpPr/>
-      </dsp:nvSpPr>
-      <dsp:spPr>
-        <a:xfrm rot="5400000">
-          <a:off x="2559537" y="1835580"/>
-          <a:ext cx="2008628" cy="1747506"/>
-        </a:xfrm>
-        <a:prstGeom prst="hexagon">
-          <a:avLst>
-            <a:gd name="adj" fmla="val 25000"/>
-            <a:gd name="vf" fmla="val 115470"/>
-          </a:avLst>
-        </a:prstGeom>
-        <a:solidFill>
-          <a:schemeClr val="accent1">
-            <a:hueOff val="0"/>
-            <a:satOff val="0"/>
-            <a:lumOff val="0"/>
-            <a:alphaOff val="0"/>
-          </a:schemeClr>
-        </a:solidFill>
-        <a:ln w="12700" cap="flat" cmpd="sng" algn="ctr">
-          <a:solidFill>
-            <a:schemeClr val="lt1">
-              <a:hueOff val="0"/>
-              <a:satOff val="0"/>
-              <a:lumOff val="0"/>
-              <a:alphaOff val="0"/>
-            </a:schemeClr>
-          </a:solidFill>
-          <a:prstDash val="solid"/>
-          <a:miter lim="800000"/>
-        </a:ln>
-        <a:effectLst/>
-      </dsp:spPr>
-      <dsp:style>
-        <a:lnRef idx="2">
-          <a:scrgbClr r="0" g="0" b="0"/>
-        </a:lnRef>
-        <a:fillRef idx="1">
-          <a:scrgbClr r="0" g="0" b="0"/>
-        </a:fillRef>
-        <a:effectRef idx="0">
-          <a:scrgbClr r="0" g="0" b="0"/>
-        </a:effectRef>
-        <a:fontRef idx="minor">
-          <a:schemeClr val="lt1"/>
-        </a:fontRef>
-      </dsp:style>
-      <dsp:txBody>
-        <a:bodyPr spcFirstLastPara="0" vert="horz" wrap="square" lIns="57150" tIns="57150" rIns="57150" bIns="57150" numCol="1" spcCol="1270" anchor="ctr" anchorCtr="0">
-          <a:noAutofit/>
-        </a:bodyPr>
-        <a:lstStyle/>
-        <a:p>
-          <a:pPr marL="0" lvl="0" indent="0" algn="ctr" defTabSz="666750">
-            <a:lnSpc>
-              <a:spcPct val="90000"/>
-            </a:lnSpc>
-            <a:spcBef>
-              <a:spcPct val="0"/>
-            </a:spcBef>
-            <a:spcAft>
-              <a:spcPct val="35000"/>
-            </a:spcAft>
-            <a:buNone/>
-          </a:pPr>
-          <a:r>
-            <a:rPr lang="en-US" sz="1500" kern="1200" dirty="0"/>
-            <a:t>Development</a:t>
-          </a:r>
-        </a:p>
-      </dsp:txBody>
-      <dsp:txXfrm rot="-5400000">
-        <a:off x="2962418" y="2018030"/>
-        <a:ext cx="1202866" cy="1382606"/>
-      </dsp:txXfrm>
-    </dsp:sp>
-    <dsp:sp modelId="{8F15F0E2-A739-4E0F-9728-ADA4AA103421}">
-      <dsp:nvSpPr>
-        <dsp:cNvPr id="0" name=""/>
-        <dsp:cNvSpPr/>
-      </dsp:nvSpPr>
-      <dsp:spPr>
-        <a:xfrm>
-          <a:off x="448468" y="2106744"/>
-          <a:ext cx="2169318" cy="1205177"/>
-        </a:xfrm>
-        <a:prstGeom prst="rect">
-          <a:avLst/>
-        </a:prstGeom>
-        <a:noFill/>
-        <a:ln>
-          <a:noFill/>
-        </a:ln>
-        <a:effectLst/>
-      </dsp:spPr>
-      <dsp:style>
-        <a:lnRef idx="0">
-          <a:scrgbClr r="0" g="0" b="0"/>
-        </a:lnRef>
-        <a:fillRef idx="0">
-          <a:scrgbClr r="0" g="0" b="0"/>
-        </a:fillRef>
-        <a:effectRef idx="0">
-          <a:scrgbClr r="0" g="0" b="0"/>
-        </a:effectRef>
-        <a:fontRef idx="minor"/>
-      </dsp:style>
-      <dsp:txBody>
-        <a:bodyPr spcFirstLastPara="0" vert="horz" wrap="square" lIns="57150" tIns="57150" rIns="57150" bIns="57150" numCol="1" spcCol="1270" anchor="ctr" anchorCtr="0">
-          <a:noAutofit/>
-        </a:bodyPr>
-        <a:lstStyle/>
-        <a:p>
-          <a:pPr marL="0" lvl="0" indent="0" algn="r" defTabSz="666750">
-            <a:lnSpc>
-              <a:spcPct val="90000"/>
-            </a:lnSpc>
-            <a:spcBef>
-              <a:spcPct val="0"/>
-            </a:spcBef>
-            <a:spcAft>
-              <a:spcPct val="35000"/>
-            </a:spcAft>
-            <a:buNone/>
-          </a:pPr>
-          <a:r>
-            <a:rPr lang="en-US" sz="1500" kern="1200" dirty="0"/>
-            <a:t>Tool</a:t>
-          </a:r>
-        </a:p>
-      </dsp:txBody>
-      <dsp:txXfrm>
-        <a:off x="448468" y="2106744"/>
-        <a:ext cx="2169318" cy="1205177"/>
-      </dsp:txXfrm>
-    </dsp:sp>
-    <dsp:sp modelId="{3CB1DD77-A7DA-4C8B-8801-2BF5D7AF0DEB}">
-      <dsp:nvSpPr>
-        <dsp:cNvPr id="0" name=""/>
-        <dsp:cNvSpPr/>
-      </dsp:nvSpPr>
-      <dsp:spPr>
-        <a:xfrm rot="5400000">
-          <a:off x="4446844" y="1835580"/>
-          <a:ext cx="2008628" cy="1747506"/>
-        </a:xfrm>
-        <a:prstGeom prst="hexagon">
-          <a:avLst>
-            <a:gd name="adj" fmla="val 25000"/>
-            <a:gd name="vf" fmla="val 115470"/>
-          </a:avLst>
-        </a:prstGeom>
-        <a:solidFill>
-          <a:schemeClr val="accent1">
-            <a:hueOff val="0"/>
-            <a:satOff val="0"/>
-            <a:lumOff val="0"/>
-            <a:alphaOff val="0"/>
-          </a:schemeClr>
-        </a:solidFill>
-        <a:ln w="12700" cap="flat" cmpd="sng" algn="ctr">
-          <a:solidFill>
-            <a:schemeClr val="lt1">
-              <a:hueOff val="0"/>
-              <a:satOff val="0"/>
-              <a:lumOff val="0"/>
-              <a:alphaOff val="0"/>
-            </a:schemeClr>
-          </a:solidFill>
-          <a:prstDash val="solid"/>
-          <a:miter lim="800000"/>
-        </a:ln>
-        <a:effectLst/>
-      </dsp:spPr>
-      <dsp:style>
-        <a:lnRef idx="2">
-          <a:scrgbClr r="0" g="0" b="0"/>
-        </a:lnRef>
-        <a:fillRef idx="1">
-          <a:scrgbClr r="0" g="0" b="0"/>
-        </a:fillRef>
-        <a:effectRef idx="0">
-          <a:scrgbClr r="0" g="0" b="0"/>
-        </a:effectRef>
-        <a:fontRef idx="minor">
-          <a:schemeClr val="lt1"/>
-        </a:fontRef>
-      </dsp:style>
-      <dsp:txBody>
-        <a:bodyPr spcFirstLastPara="0" vert="horz" wrap="square" lIns="0" tIns="0" rIns="0" bIns="0" numCol="1" spcCol="1270" anchor="ctr" anchorCtr="0">
-          <a:noAutofit/>
-        </a:bodyPr>
-        <a:lstStyle/>
-        <a:p>
-          <a:pPr marL="0" lvl="0" indent="0" algn="ctr" defTabSz="1600200">
-            <a:lnSpc>
-              <a:spcPct val="90000"/>
-            </a:lnSpc>
-            <a:spcBef>
-              <a:spcPct val="0"/>
-            </a:spcBef>
-            <a:spcAft>
-              <a:spcPct val="35000"/>
-            </a:spcAft>
-            <a:buNone/>
-          </a:pPr>
-          <a:endParaRPr lang="en-US" sz="3600" kern="1200"/>
-        </a:p>
-      </dsp:txBody>
-      <dsp:txXfrm rot="-5400000">
-        <a:off x="4849725" y="2018030"/>
-        <a:ext cx="1202866" cy="1382606"/>
-      </dsp:txXfrm>
-    </dsp:sp>
-    <dsp:sp modelId="{E15322BA-E40D-4BA8-A1EB-CAC67AC64C03}">
-      <dsp:nvSpPr>
-        <dsp:cNvPr id="0" name=""/>
-        <dsp:cNvSpPr/>
-      </dsp:nvSpPr>
-      <dsp:spPr>
-        <a:xfrm rot="5400000">
-          <a:off x="3506806" y="3540503"/>
-          <a:ext cx="2008628" cy="1747506"/>
-        </a:xfrm>
-        <a:prstGeom prst="hexagon">
-          <a:avLst>
-            <a:gd name="adj" fmla="val 25000"/>
-            <a:gd name="vf" fmla="val 115470"/>
-          </a:avLst>
-        </a:prstGeom>
-        <a:solidFill>
-          <a:schemeClr val="accent1">
-            <a:hueOff val="0"/>
-            <a:satOff val="0"/>
-            <a:lumOff val="0"/>
-            <a:alphaOff val="0"/>
-          </a:schemeClr>
-        </a:solidFill>
-        <a:ln w="12700" cap="flat" cmpd="sng" algn="ctr">
-          <a:solidFill>
-            <a:schemeClr val="lt1">
-              <a:hueOff val="0"/>
-              <a:satOff val="0"/>
-              <a:lumOff val="0"/>
-              <a:alphaOff val="0"/>
-            </a:schemeClr>
-          </a:solidFill>
-          <a:prstDash val="solid"/>
-          <a:miter lim="800000"/>
-        </a:ln>
-        <a:effectLst/>
-      </dsp:spPr>
-      <dsp:style>
-        <a:lnRef idx="2">
-          <a:scrgbClr r="0" g="0" b="0"/>
-        </a:lnRef>
-        <a:fillRef idx="1">
-          <a:scrgbClr r="0" g="0" b="0"/>
-        </a:fillRef>
-        <a:effectRef idx="0">
-          <a:scrgbClr r="0" g="0" b="0"/>
-        </a:effectRef>
-        <a:fontRef idx="minor">
-          <a:schemeClr val="lt1"/>
-        </a:fontRef>
-      </dsp:style>
-      <dsp:txBody>
-        <a:bodyPr spcFirstLastPara="0" vert="horz" wrap="square" lIns="57150" tIns="57150" rIns="57150" bIns="57150" numCol="1" spcCol="1270" anchor="ctr" anchorCtr="0">
-          <a:noAutofit/>
-        </a:bodyPr>
-        <a:lstStyle/>
-        <a:p>
-          <a:pPr marL="0" lvl="0" indent="0" algn="ctr" defTabSz="666750">
-            <a:lnSpc>
-              <a:spcPct val="90000"/>
-            </a:lnSpc>
-            <a:spcBef>
-              <a:spcPct val="0"/>
-            </a:spcBef>
-            <a:spcAft>
-              <a:spcPct val="35000"/>
-            </a:spcAft>
-            <a:buNone/>
-          </a:pPr>
-          <a:r>
-            <a:rPr lang="en-US" sz="1500" kern="1200" dirty="0"/>
-            <a:t>Personal</a:t>
-          </a:r>
-        </a:p>
-      </dsp:txBody>
-      <dsp:txXfrm rot="-5400000">
-        <a:off x="3909687" y="3722953"/>
-        <a:ext cx="1202866" cy="1382606"/>
-      </dsp:txXfrm>
-    </dsp:sp>
-    <dsp:sp modelId="{1C776C71-E52D-4672-A82E-2D1E4CB80C50}">
-      <dsp:nvSpPr>
-        <dsp:cNvPr id="0" name=""/>
-        <dsp:cNvSpPr/>
-      </dsp:nvSpPr>
-      <dsp:spPr>
-        <a:xfrm>
-          <a:off x="5437901" y="3811668"/>
-          <a:ext cx="2241629" cy="1205177"/>
-        </a:xfrm>
-        <a:prstGeom prst="rect">
-          <a:avLst/>
-        </a:prstGeom>
-        <a:noFill/>
-        <a:ln>
-          <a:noFill/>
-        </a:ln>
-        <a:effectLst/>
-      </dsp:spPr>
-      <dsp:style>
-        <a:lnRef idx="0">
-          <a:scrgbClr r="0" g="0" b="0"/>
-        </a:lnRef>
-        <a:fillRef idx="0">
-          <a:scrgbClr r="0" g="0" b="0"/>
-        </a:fillRef>
-        <a:effectRef idx="0">
-          <a:scrgbClr r="0" g="0" b="0"/>
-        </a:effectRef>
-        <a:fontRef idx="minor"/>
-      </dsp:style>
-      <dsp:txBody>
-        <a:bodyPr spcFirstLastPara="0" vert="horz" wrap="square" lIns="57150" tIns="57150" rIns="57150" bIns="57150" numCol="1" spcCol="1270" anchor="ctr" anchorCtr="0">
-          <a:noAutofit/>
-        </a:bodyPr>
-        <a:lstStyle/>
-        <a:p>
-          <a:pPr marL="0" lvl="0" indent="0" algn="l" defTabSz="666750">
-            <a:lnSpc>
-              <a:spcPct val="90000"/>
-            </a:lnSpc>
-            <a:spcBef>
-              <a:spcPct val="0"/>
-            </a:spcBef>
-            <a:spcAft>
-              <a:spcPct val="35000"/>
-            </a:spcAft>
-            <a:buNone/>
-          </a:pPr>
-          <a:r>
-            <a:rPr lang="en-US" sz="1500" kern="1200" dirty="0"/>
-            <a:t>Details</a:t>
-          </a:r>
-        </a:p>
-      </dsp:txBody>
-      <dsp:txXfrm>
-        <a:off x="5437901" y="3811668"/>
-        <a:ext cx="2241629" cy="1205177"/>
-      </dsp:txXfrm>
-    </dsp:sp>
-    <dsp:sp modelId="{6283C350-90C8-4407-8F54-02837F9F89ED}">
-      <dsp:nvSpPr>
-        <dsp:cNvPr id="0" name=""/>
-        <dsp:cNvSpPr/>
-      </dsp:nvSpPr>
-      <dsp:spPr>
-        <a:xfrm rot="5400000">
-          <a:off x="1619499" y="3540503"/>
-          <a:ext cx="2008628" cy="1747506"/>
-        </a:xfrm>
-        <a:prstGeom prst="hexagon">
-          <a:avLst>
-            <a:gd name="adj" fmla="val 25000"/>
-            <a:gd name="vf" fmla="val 115470"/>
-          </a:avLst>
-        </a:prstGeom>
-        <a:solidFill>
-          <a:schemeClr val="accent1">
-            <a:hueOff val="0"/>
-            <a:satOff val="0"/>
-            <a:lumOff val="0"/>
-            <a:alphaOff val="0"/>
-          </a:schemeClr>
-        </a:solidFill>
-        <a:ln w="12700" cap="flat" cmpd="sng" algn="ctr">
-          <a:solidFill>
-            <a:schemeClr val="lt1">
-              <a:hueOff val="0"/>
-              <a:satOff val="0"/>
-              <a:lumOff val="0"/>
-              <a:alphaOff val="0"/>
-            </a:schemeClr>
-          </a:solidFill>
-          <a:prstDash val="solid"/>
-          <a:miter lim="800000"/>
-        </a:ln>
-        <a:effectLst/>
-      </dsp:spPr>
-      <dsp:style>
-        <a:lnRef idx="2">
-          <a:scrgbClr r="0" g="0" b="0"/>
-        </a:lnRef>
-        <a:fillRef idx="1">
-          <a:scrgbClr r="0" g="0" b="0"/>
-        </a:fillRef>
-        <a:effectRef idx="0">
-          <a:scrgbClr r="0" g="0" b="0"/>
-        </a:effectRef>
-        <a:fontRef idx="minor">
-          <a:schemeClr val="lt1"/>
-        </a:fontRef>
-      </dsp:style>
-      <dsp:txBody>
-        <a:bodyPr spcFirstLastPara="0" vert="horz" wrap="square" lIns="0" tIns="0" rIns="0" bIns="0" numCol="1" spcCol="1270" anchor="ctr" anchorCtr="0">
-          <a:noAutofit/>
-        </a:bodyPr>
-        <a:lstStyle/>
-        <a:p>
-          <a:pPr marL="0" lvl="0" indent="0" algn="ctr" defTabSz="1600200">
-            <a:lnSpc>
-              <a:spcPct val="90000"/>
-            </a:lnSpc>
-            <a:spcBef>
-              <a:spcPct val="0"/>
-            </a:spcBef>
-            <a:spcAft>
-              <a:spcPct val="35000"/>
-            </a:spcAft>
-            <a:buNone/>
-          </a:pPr>
-          <a:endParaRPr lang="en-US" sz="3600" kern="1200"/>
-        </a:p>
-      </dsp:txBody>
-      <dsp:txXfrm rot="-5400000">
-        <a:off x="2022380" y="3722953"/>
-        <a:ext cx="1202866" cy="1382606"/>
-      </dsp:txXfrm>
-    </dsp:sp>
-  </dsp:spTree>
-</dsp:drawing>
-</file>
-
-<file path=ppt/diagrams/layout1.xml><?xml version="1.0" encoding="utf-8"?>
-<dgm:layoutDef xmlns:dgm="http://schemas.openxmlformats.org/drawingml/2006/diagram" xmlns:a="http://schemas.openxmlformats.org/drawingml/2006/main" uniqueId="urn:microsoft.com/office/officeart/2008/layout/AlternatingHexagons">
-  <dgm:title val=""/>
-  <dgm:desc val=""/>
-  <dgm:catLst>
-    <dgm:cat type="list" pri="1500"/>
-  </dgm:catLst>
-  <dgm:sampData>
-    <dgm:dataModel>
-      <dgm:ptLst>
-        <dgm:pt modelId="0" type="doc"/>
-        <dgm:pt modelId="10">
-          <dgm:prSet phldr="1"/>
-        </dgm:pt>
-        <dgm:pt modelId="11">
-          <dgm:prSet phldr="1"/>
-        </dgm:pt>
-        <dgm:pt modelId="20">
-          <dgm:prSet phldr="1"/>
-        </dgm:pt>
-        <dgm:pt modelId="21">
-          <dgm:prSet phldr="1"/>
-        </dgm:pt>
-        <dgm:pt modelId="30">
-          <dgm:prSet phldr="1"/>
-        </dgm:pt>
-        <dgm:pt modelId="31">
-          <dgm:prSet phldr="1"/>
-        </dgm:pt>
-      </dgm:ptLst>
-      <dgm:cxnLst>
-        <dgm:cxn modelId="40" srcId="0" destId="10" srcOrd="0" destOrd="0"/>
-        <dgm:cxn modelId="12" srcId="10" destId="11" srcOrd="0" destOrd="0"/>
-        <dgm:cxn modelId="50" srcId="0" destId="20" srcOrd="1" destOrd="0"/>
-        <dgm:cxn modelId="22" srcId="20" destId="21" srcOrd="0" destOrd="0"/>
-        <dgm:cxn modelId="60" srcId="0" destId="30" srcOrd="1" destOrd="0"/>
-        <dgm:cxn modelId="32" srcId="30" destId="31" srcOrd="0" destOrd="0"/>
-      </dgm:cxnLst>
-      <dgm:bg/>
-      <dgm:whole/>
-    </dgm:dataModel>
-  </dgm:sampData>
-  <dgm:styleData>
-    <dgm:dataModel>
-      <dgm:ptLst>
-        <dgm:pt modelId="0" type="doc"/>
-        <dgm:pt modelId="10">
-          <dgm:prSet phldr="1"/>
-        </dgm:pt>
-        <dgm:pt modelId="20">
-          <dgm:prSet phldr="1"/>
-        </dgm:pt>
-      </dgm:ptLst>
-      <dgm:cxnLst>
-        <dgm:cxn modelId="60" srcId="0" destId="10" srcOrd="0" destOrd="0"/>
-        <dgm:cxn modelId="70" srcId="0" destId="20" srcOrd="1" destOrd="0"/>
-      </dgm:cxnLst>
-      <dgm:bg/>
-      <dgm:whole/>
-    </dgm:dataModel>
-  </dgm:styleData>
-  <dgm:clrData>
-    <dgm:dataModel>
-      <dgm:ptLst>
-        <dgm:pt modelId="0" type="doc"/>
-        <dgm:pt modelId="10">
-          <dgm:prSet phldr="1"/>
-        </dgm:pt>
-        <dgm:pt modelId="20">
-          <dgm:prSet phldr="1"/>
-        </dgm:pt>
-        <dgm:pt modelId="30">
-          <dgm:prSet phldr="1"/>
-        </dgm:pt>
-        <dgm:pt modelId="40">
-          <dgm:prSet phldr="1"/>
-        </dgm:pt>
-      </dgm:ptLst>
-      <dgm:cxnLst>
-        <dgm:cxn modelId="60" srcId="0" destId="10" srcOrd="0" destOrd="0"/>
-        <dgm:cxn modelId="70" srcId="0" destId="20" srcOrd="1" destOrd="0"/>
-        <dgm:cxn modelId="80" srcId="0" destId="30" srcOrd="2" destOrd="0"/>
-        <dgm:cxn modelId="90" srcId="0" destId="40" srcOrd="3" destOrd="0"/>
-      </dgm:cxnLst>
-      <dgm:bg/>
-      <dgm:whole/>
-    </dgm:dataModel>
-  </dgm:clrData>
-  <dgm:layoutNode name="Name0">
-    <dgm:varLst>
-      <dgm:chMax/>
-      <dgm:chPref/>
-      <dgm:dir/>
-      <dgm:animLvl val="lvl"/>
-    </dgm:varLst>
-    <dgm:alg type="lin">
-      <dgm:param type="linDir" val="fromT"/>
-    </dgm:alg>
-    <dgm:shape xmlns:r="http://schemas.openxmlformats.org/officeDocument/2006/relationships" r:blip="">
-      <dgm:adjLst/>
-    </dgm:shape>
-    <dgm:constrLst>
-      <dgm:constr type="primFontSz" for="des" forName="Parent1" val="65"/>
-      <dgm:constr type="primFontSz" for="des" forName="Childtext1" refType="primFontSz" refFor="des" refForName="Parent1" op="lte"/>
-      <dgm:constr type="w" for="ch" forName="composite" refType="w"/>
-      <dgm:constr type="h" for="ch" forName="composite" refType="h"/>
-      <dgm:constr type="h" for="ch" forName="spaceBetweenRectangles" refType="w" refFor="ch" refForName="composite" fact="-0.042"/>
-      <dgm:constr type="sp" refType="h" refFor="ch" refForName="composite" op="equ" fact="0.1"/>
-    </dgm:constrLst>
-    <dgm:forEach name="nodesForEach" axis="ch" ptType="node">
-      <dgm:layoutNode name="composite">
-        <dgm:alg type="composite">
-          <dgm:param type="ar" val="3.6"/>
-        </dgm:alg>
-        <dgm:shape xmlns:r="http://schemas.openxmlformats.org/officeDocument/2006/relationships" r:blip="">
-          <dgm:adjLst/>
-        </dgm:shape>
-        <dgm:choose name="Name1">
-          <dgm:if name="Name2" func="var" arg="dir" op="equ" val="norm">
-            <dgm:choose name="Name3">
-              <dgm:if name="Name4" axis="self" ptType="node" func="posOdd" op="equ" val="1">
-                <dgm:constrLst>
-                  <dgm:constr type="l" for="ch" forName="Accent1" refType="w" fact="0.18"/>
-                  <dgm:constr type="t" for="ch" forName="Accent1" refType="h" fact="0"/>
-                  <dgm:constr type="h" for="ch" forName="Accent1" refType="h"/>
-                  <dgm:constr type="w" for="ch" forName="Accent1" refType="h" fact="0.87"/>
-                  <dgm:constr type="l" for="ch" forName="Accent1Text" refType="w" fact="0.18"/>
-                  <dgm:constr type="t" for="ch" forName="Accent1Text" refType="h" fact="0"/>
-                  <dgm:constr type="h" for="ch" forName="Accent1Text" refType="h"/>
-                  <dgm:constr type="w" for="ch" forName="Accent1Text" refType="h" fact="0.87"/>
-                  <dgm:constr type="l" for="ch" forName="Parent1" refType="w" fact="0.441"/>
-                  <dgm:constr type="t" for="ch" forName="Parent1" refType="h" fact="0"/>
-                  <dgm:constr type="h" for="ch" forName="Parent1" refType="h"/>
-                  <dgm:constr type="w" for="ch" forName="Parent1" refType="h" fact="0.87"/>
-                  <dgm:constr type="l" for="ch" forName="Childtext1" refType="w" fact="0.69"/>
-                  <dgm:constr type="t" for="ch" forName="Childtext1" refType="h" fact="0.2"/>
-                  <dgm:constr type="w" for="ch" forName="Childtext1" refType="w" fact="0.31"/>
-                  <dgm:constr type="h" for="ch" forName="Childtext1" refType="h" fact="0.6"/>
-                  <dgm:constr type="l" for="ch" forName="BalanceSpacing" refType="w" fact="0"/>
-                  <dgm:constr type="t" for="ch" forName="BalanceSpacing" refType="h" fact="0"/>
-                  <dgm:constr type="w" for="ch" forName="BalanceSpacing" refType="w"/>
-                  <dgm:constr type="h" for="ch" forName="BalanceSpacing" refType="h" fact="0.1"/>
-                  <dgm:constr type="l" for="ch" forName="BalanceSpacing1" refType="w" fact="0.69"/>
-                  <dgm:constr type="t" for="ch" forName="BalanceSpacing1" refType="h" fact="0.2"/>
-                  <dgm:constr type="w" for="ch" forName="BalanceSpacing1" refType="w" fact="0.31"/>
-                  <dgm:constr type="h" for="ch" forName="BalanceSpacing1" refType="h" fact="0.6"/>
-                </dgm:constrLst>
-              </dgm:if>
-              <dgm:else name="Name5">
-                <dgm:constrLst>
-                  <dgm:constr type="l" for="ch" forName="Accent1" refType="w" fact="0.571"/>
-                  <dgm:constr type="t" for="ch" forName="Accent1" refType="h" fact="0"/>
-                  <dgm:constr type="h" for="ch" forName="Accent1" refType="h"/>
-                  <dgm:constr type="w" for="ch" forName="Accent1" refType="h" fact="0.87"/>
-                  <dgm:constr type="l" for="ch" forName="Accent1Text" refType="w" fact="0.571"/>
-                  <dgm:constr type="t" for="ch" forName="Accent1Text" refType="h" fact="0"/>
-                  <dgm:constr type="h" for="ch" forName="Accent1Text" refType="h"/>
-                  <dgm:constr type="w" for="ch" forName="Accent1Text" refType="h" fact="0.87"/>
-                  <dgm:constr type="l" for="ch" forName="Parent1" refType="w" fact="0.31"/>
-                  <dgm:constr type="t" for="ch" forName="Parent1" refType="h" fact="0"/>
-                  <dgm:constr type="h" for="ch" forName="Parent1" refType="h"/>
-                  <dgm:constr type="w" for="ch" forName="Parent1" refType="h" fact="0.87"/>
-                  <dgm:constr type="l" for="ch" forName="Childtext1" refType="w" fact="0"/>
-                  <dgm:constr type="t" for="ch" forName="Childtext1" refType="h" fact="0.2"/>
-                  <dgm:constr type="w" for="ch" forName="Childtext1" refType="w" fact="0.3"/>
-                  <dgm:constr type="h" for="ch" forName="Childtext1" refType="h" fact="0.6"/>
-                  <dgm:constr type="l" for="ch" forName="BalanceSpacing" refType="w" fact="0.82"/>
-                  <dgm:constr type="t" for="ch" forName="BalanceSpacing" refType="h" fact="0"/>
-                  <dgm:constr type="w" for="ch" forName="BalanceSpacing" refType="w" fact="0.18"/>
-                  <dgm:constr type="h" for="ch" forName="BalanceSpacing" refType="h"/>
-                  <dgm:constr type="l" for="ch" forName="BalanceSpacing1" refType="w" fact="0"/>
-                  <dgm:constr type="t" for="ch" forName="BalanceSpacing1" refType="h" fact="0.2"/>
-                  <dgm:constr type="w" for="ch" forName="BalanceSpacing1" refType="w" fact="0.3"/>
-                  <dgm:constr type="h" for="ch" forName="BalanceSpacing1" refType="h" fact="0.6"/>
-                </dgm:constrLst>
-              </dgm:else>
-            </dgm:choose>
-          </dgm:if>
-          <dgm:else name="Name6">
-            <dgm:choose name="Name7">
-              <dgm:if name="Name8" axis="self" ptType="node" func="posOdd" op="equ" val="1">
-                <dgm:constrLst>
-                  <dgm:constr type="l" for="ch" forName="Accent1" refType="w" fact="0.571"/>
-                  <dgm:constr type="t" for="ch" forName="Accent1" refType="h" fact="0"/>
-                  <dgm:constr type="h" for="ch" forName="Accent1" refType="h"/>
-                  <dgm:constr type="w" for="ch" forName="Accent1" refType="h" fact="0.87"/>
-                  <dgm:constr type="l" for="ch" forName="Accent1Text" refType="w" fact="0.571"/>
-                  <dgm:constr type="t" for="ch" forName="Accent1Text" refType="h" fact="0"/>
-                  <dgm:constr type="h" for="ch" forName="Accent1Text" refType="h"/>
-                  <dgm:constr type="w" for="ch" forName="Accent1Text" refType="h" fact="0.87"/>
-                  <dgm:constr type="l" for="ch" forName="Parent1" refType="w" fact="0.31"/>
-                  <dgm:constr type="t" for="ch" forName="Parent1" refType="h" fact="0"/>
-                  <dgm:constr type="h" for="ch" forName="Parent1" refType="h"/>
-                  <dgm:constr type="w" for="ch" forName="Parent1" refType="h" fact="0.87"/>
-                  <dgm:constr type="l" for="ch" forName="Childtext1" refType="w" fact="0"/>
-                  <dgm:constr type="t" for="ch" forName="Childtext1" refType="h" fact="0.2"/>
-                  <dgm:constr type="w" for="ch" forName="Childtext1" refType="w" fact="0.3"/>
-                  <dgm:constr type="h" for="ch" forName="Childtext1" refType="h" fact="0.6"/>
-                  <dgm:constr type="l" for="ch" forName="BalanceSpacing" refType="w" fact="0.82"/>
-                  <dgm:constr type="t" for="ch" forName="BalanceSpacing" refType="h" fact="0"/>
-                  <dgm:constr type="w" for="ch" forName="BalanceSpacing" refType="w" fact="0.18"/>
-                  <dgm:constr type="h" for="ch" forName="BalanceSpacing" refType="h"/>
-                </dgm:constrLst>
-              </dgm:if>
-              <dgm:else name="Name9">
-                <dgm:constrLst>
-                  <dgm:constr type="l" for="ch" forName="Accent1" refType="w" fact="0.18"/>
-                  <dgm:constr type="t" for="ch" forName="Accent1" refType="h" fact="0"/>
-                  <dgm:constr type="h" for="ch" forName="Accent1" refType="h"/>
-                  <dgm:constr type="w" for="ch" forName="Accent1" refType="h" fact="0.87"/>
-                  <dgm:constr type="l" for="ch" forName="Accent1Text" refType="w" fact="0.18"/>
-                  <dgm:constr type="t" for="ch" forName="Accent1Text" refType="h" fact="0"/>
-                  <dgm:constr type="h" for="ch" forName="Accent1Text" refType="h"/>
-                  <dgm:constr type="w" for="ch" forName="Accent1Text" refType="h" fact="0.87"/>
-                  <dgm:constr type="l" for="ch" forName="Parent1" refType="w" fact="0.441"/>
-                  <dgm:constr type="t" for="ch" forName="Parent1" refType="h" fact="0"/>
-                  <dgm:constr type="h" for="ch" forName="Parent1" refType="h"/>
-                  <dgm:constr type="w" for="ch" forName="Parent1" refType="h" fact="0.87"/>
-                  <dgm:constr type="l" for="ch" forName="Childtext1" refType="w" fact="0.69"/>
-                  <dgm:constr type="t" for="ch" forName="Childtext1" refType="h" fact="0.2"/>
-                  <dgm:constr type="w" for="ch" forName="Childtext1" refType="w" fact="0.31"/>
-                  <dgm:constr type="h" for="ch" forName="Childtext1" refType="h" fact="0.6"/>
-                  <dgm:constr type="l" for="ch" forName="BalanceSpacing" refType="w" fact="0"/>
-                  <dgm:constr type="t" for="ch" forName="BalanceSpacing" refType="h" fact="0"/>
-                  <dgm:constr type="w" for="ch" forName="BalanceSpacing" refType="w" fact="0.18"/>
-                  <dgm:constr type="h" for="ch" forName="BalanceSpacing" refType="h"/>
-                </dgm:constrLst>
-              </dgm:else>
-            </dgm:choose>
-          </dgm:else>
-        </dgm:choose>
-        <dgm:layoutNode name="Parent1" styleLbl="node1">
-          <dgm:varLst>
-            <dgm:chMax val="1"/>
-            <dgm:chPref val="1"/>
-            <dgm:bulletEnabled val="1"/>
-          </dgm:varLst>
-          <dgm:alg type="tx"/>
-          <dgm:shape xmlns:r="http://schemas.openxmlformats.org/officeDocument/2006/relationships" rot="90" type="hexagon" r:blip="">
-            <dgm:adjLst>
-              <dgm:adj idx="1" val="0.25"/>
-              <dgm:adj idx="2" val="1.1547"/>
-            </dgm:adjLst>
-          </dgm:shape>
-          <dgm:presOf axis="self" ptType="node"/>
-          <dgm:constrLst>
-            <dgm:constr type="lMarg" refType="primFontSz" fact="0.3"/>
-            <dgm:constr type="rMarg" refType="primFontSz" fact="0.3"/>
-            <dgm:constr type="tMarg" refType="primFontSz" fact="0.3"/>
-            <dgm:constr type="bMarg" refType="primFontSz" fact="0.3"/>
-          </dgm:constrLst>
-          <dgm:ruleLst>
-            <dgm:rule type="primFontSz" val="5" fact="NaN" max="NaN"/>
-          </dgm:ruleLst>
-        </dgm:layoutNode>
-        <dgm:layoutNode name="Childtext1" styleLbl="revTx">
-          <dgm:varLst>
-            <dgm:chMax val="0"/>
-            <dgm:chPref val="0"/>
-            <dgm:bulletEnabled val="1"/>
-          </dgm:varLst>
-          <dgm:choose name="Name10">
-            <dgm:if name="Name11" func="var" arg="dir" op="equ" val="norm">
-              <dgm:choose name="Name12">
-                <dgm:if name="Name13" axis="self" ptType="node" func="posOdd" op="equ" val="1">
-                  <dgm:alg type="tx">
-                    <dgm:param type="parTxLTRAlign" val="l"/>
-                  </dgm:alg>
-                </dgm:if>
-                <dgm:else name="Name14">
-                  <dgm:alg type="tx">
-                    <dgm:param type="parTxLTRAlign" val="r"/>
-                  </dgm:alg>
-                </dgm:else>
-              </dgm:choose>
-            </dgm:if>
-            <dgm:else name="Name15">
-              <dgm:choose name="Name16">
-                <dgm:if name="Name17" axis="self" ptType="node" func="posOdd" op="equ" val="1">
-                  <dgm:alg type="tx">
-                    <dgm:param type="parTxLTRAlign" val="r"/>
-                  </dgm:alg>
-                </dgm:if>
-                <dgm:else name="Name18">
-                  <dgm:alg type="tx">
-                    <dgm:param type="parTxLTRAlign" val="l"/>
-                  </dgm:alg>
-                </dgm:else>
-              </dgm:choose>
-            </dgm:else>
-          </dgm:choose>
-          <dgm:shape xmlns:r="http://schemas.openxmlformats.org/officeDocument/2006/relationships" type="rect" r:blip="">
-            <dgm:adjLst/>
-          </dgm:shape>
-          <dgm:presOf axis="des" ptType="node"/>
-          <dgm:constrLst>
-            <dgm:constr type="lMarg" refType="primFontSz" fact="0.3"/>
-            <dgm:constr type="rMarg" refType="primFontSz" fact="0.3"/>
-            <dgm:constr type="tMarg" refType="primFontSz" fact="0.3"/>
-            <dgm:constr type="bMarg" refType="primFontSz" fact="0.3"/>
-          </dgm:constrLst>
-          <dgm:ruleLst>
-            <dgm:rule type="primFontSz" val="5" fact="NaN" max="NaN"/>
-          </dgm:ruleLst>
-        </dgm:layoutNode>
-        <dgm:layoutNode name="BalanceSpacing">
-          <dgm:alg type="sp"/>
-          <dgm:shape xmlns:r="http://schemas.openxmlformats.org/officeDocument/2006/relationships" r:blip="">
-            <dgm:adjLst/>
-          </dgm:shape>
-        </dgm:layoutNode>
-        <dgm:layoutNode name="BalanceSpacing1">
-          <dgm:alg type="sp"/>
-          <dgm:shape xmlns:r="http://schemas.openxmlformats.org/officeDocument/2006/relationships" r:blip="">
-            <dgm:adjLst/>
-          </dgm:shape>
-        </dgm:layoutNode>
-        <dgm:forEach name="Name19" axis="followSib" ptType="sibTrans" hideLastTrans="0" cnt="1">
-          <dgm:layoutNode name="Accent1Text" styleLbl="node1">
-            <dgm:alg type="tx"/>
-            <dgm:shape xmlns:r="http://schemas.openxmlformats.org/officeDocument/2006/relationships" rot="90" type="hexagon" r:blip="">
-              <dgm:adjLst>
-                <dgm:adj idx="1" val="0.25"/>
-                <dgm:adj idx="2" val="1.1547"/>
-              </dgm:adjLst>
-            </dgm:shape>
-            <dgm:presOf axis="self" ptType="sibTrans"/>
-            <dgm:constrLst>
-              <dgm:constr type="lMarg"/>
-              <dgm:constr type="rMarg"/>
-              <dgm:constr type="tMarg"/>
-              <dgm:constr type="bMarg"/>
-            </dgm:constrLst>
-            <dgm:ruleLst>
-              <dgm:rule type="primFontSz" val="5" fact="NaN" max="NaN"/>
-            </dgm:ruleLst>
-          </dgm:layoutNode>
-        </dgm:forEach>
-      </dgm:layoutNode>
-      <dgm:forEach name="Name20" axis="followSib" ptType="sibTrans" cnt="1">
-        <dgm:layoutNode name="spaceBetweenRectangles">
-          <dgm:alg type="sp"/>
-          <dgm:shape xmlns:r="http://schemas.openxmlformats.org/officeDocument/2006/relationships" r:blip="">
-            <dgm:adjLst/>
-          </dgm:shape>
-          <dgm:presOf/>
-          <dgm:constrLst/>
-          <dgm:ruleLst/>
-        </dgm:layoutNode>
-      </dgm:forEach>
-    </dgm:forEach>
-  </dgm:layoutNode>
-</dgm:layoutDef>
-</file>
-
-<file path=ppt/diagrams/quickStyle1.xml><?xml version="1.0" encoding="utf-8"?>
-<dgm:styleDef xmlns:dgm="http://schemas.openxmlformats.org/drawingml/2006/diagram" xmlns:a="http://schemas.openxmlformats.org/drawingml/2006/main" uniqueId="urn:microsoft.com/office/officeart/2005/8/quickstyle/simple1">
-  <dgm:title val=""/>
-  <dgm:desc val=""/>
-  <dgm:catLst>
-    <dgm:cat type="simple" pri="10100"/>
-  </dgm:catLst>
-  <dgm:scene3d>
-    <a:camera prst="orthographicFront"/>
-    <a:lightRig rig="threePt" dir="t"/>
-  </dgm:scene3d>
-  <dgm:styleLbl name="node0">
-    <dgm:scene3d>
-      <a:camera prst="orthographicFront"/>
-      <a:lightRig rig="threePt" dir="t"/>
-    </dgm:scene3d>
-    <dgm:sp3d/>
-    <dgm:txPr/>
-    <dgm:style>
-      <a:lnRef idx="2">
-        <a:scrgbClr r="0" g="0" b="0"/>
-      </a:lnRef>
-      <a:fillRef idx="1">
-        <a:scrgbClr r="0" g="0" b="0"/>
-      </a:fillRef>
-      <a:effectRef idx="0">
-        <a:scrgbClr r="0" g="0" b="0"/>
-      </a:effectRef>
-      <a:fontRef idx="minor">
-        <a:schemeClr val="lt1"/>
-      </a:fontRef>
-    </dgm:style>
-  </dgm:styleLbl>
-  <dgm:styleLbl name="lnNode1">
-    <dgm:scene3d>
-      <a:camera prst="orthographicFront"/>
-      <a:lightRig rig="threePt" dir="t"/>
-    </dgm:scene3d>
-    <dgm:sp3d/>
-    <dgm:txPr/>
-    <dgm:style>
-      <a:lnRef idx="2">
-        <a:scrgbClr r="0" g="0" b="0"/>
-      </a:lnRef>
-      <a:fillRef idx="1">
-        <a:scrgbClr r="0" g="0" b="0"/>
-      </a:fillRef>
-      <a:effectRef idx="0">
-        <a:scrgbClr r="0" g="0" b="0"/>
-      </a:effectRef>
-      <a:fontRef idx="minor">
-        <a:schemeClr val="lt1"/>
-      </a:fontRef>
-    </dgm:style>
-  </dgm:styleLbl>
-  <dgm:styleLbl name="vennNode1">
-    <dgm:scene3d>
-      <a:camera prst="orthographicFront"/>
-      <a:lightRig rig="threePt" dir="t"/>
-    </dgm:scene3d>
-    <dgm:sp3d/>
-    <dgm:txPr/>
-    <dgm:style>
-      <a:lnRef idx="2">
-        <a:scrgbClr r="0" g="0" b="0"/>
-      </a:lnRef>
-      <a:fillRef idx="1">
-        <a:scrgbClr r="0" g="0" b="0"/>
-      </a:fillRef>
-      <a:effectRef idx="0">
-        <a:scrgbClr r="0" g="0" b="0"/>
-      </a:effectRef>
-      <a:fontRef idx="minor">
-        <a:schemeClr val="tx1"/>
-      </a:fontRef>
-    </dgm:style>
-  </dgm:styleLbl>
-  <dgm:styleLbl name="alignNode1">
-    <dgm:scene3d>
-      <a:camera prst="orthographicFront"/>
-      <a:lightRig rig="threePt" dir="t"/>
-    </dgm:scene3d>
-    <dgm:sp3d/>
-    <dgm:txPr/>
-    <dgm:style>
-      <a:lnRef idx="2">
-        <a:scrgbClr r="0" g="0" b="0"/>
-      </a:lnRef>
-      <a:fillRef idx="1">
-        <a:scrgbClr r="0" g="0" b="0"/>
-      </a:fillRef>
-      <a:effectRef idx="0">
-        <a:scrgbClr r="0" g="0" b="0"/>
-      </a:effectRef>
-      <a:fontRef idx="minor">
-        <a:schemeClr val="lt1"/>
-      </a:fontRef>
-    </dgm:style>
-  </dgm:styleLbl>
-  <dgm:styleLbl name="node1">
-    <dgm:scene3d>
-      <a:camera prst="orthographicFront"/>
-      <a:lightRig rig="threePt" dir="t"/>
-    </dgm:scene3d>
-    <dgm:sp3d/>
-    <dgm:txPr/>
-    <dgm:style>
-      <a:lnRef idx="2">
-        <a:scrgbClr r="0" g="0" b="0"/>
-      </a:lnRef>
-      <a:fillRef idx="1">
-        <a:scrgbClr r="0" g="0" b="0"/>
-      </a:fillRef>
-      <a:effectRef idx="0">
-        <a:scrgbClr r="0" g="0" b="0"/>
-      </a:effectRef>
-      <a:fontRef idx="minor">
-        <a:schemeClr val="lt1"/>
-      </a:fontRef>
-    </dgm:style>
-  </dgm:styleLbl>
-  <dgm:styleLbl name="node2">
-    <dgm:scene3d>
-      <a:camera prst="orthographicFront"/>
-      <a:lightRig rig="threePt" dir="t"/>
-    </dgm:scene3d>
-    <dgm:sp3d/>
-    <dgm:txPr/>
-    <dgm:style>
-      <a:lnRef idx="2">
-        <a:scrgbClr r="0" g="0" b="0"/>
-      </a:lnRef>
-      <a:fillRef idx="1">
-        <a:scrgbClr r="0" g="0" b="0"/>
-      </a:fillRef>
-      <a:effectRef idx="0">
-        <a:scrgbClr r="0" g="0" b="0"/>
-      </a:effectRef>
-      <a:fontRef idx="minor">
-        <a:schemeClr val="lt1"/>
-      </a:fontRef>
-    </dgm:style>
-  </dgm:styleLbl>
-  <dgm:styleLbl name="node3">
-    <dgm:scene3d>
-      <a:camera prst="orthographicFront"/>
-      <a:lightRig rig="threePt" dir="t"/>
-    </dgm:scene3d>
-    <dgm:sp3d/>
-    <dgm:txPr/>
-    <dgm:style>
-      <a:lnRef idx="2">
-        <a:scrgbClr r="0" g="0" b="0"/>
-      </a:lnRef>
-      <a:fillRef idx="1">
-        <a:scrgbClr r="0" g="0" b="0"/>
-      </a:fillRef>
-      <a:effectRef idx="0">
-        <a:scrgbClr r="0" g="0" b="0"/>
-      </a:effectRef>
-      <a:fontRef idx="minor">
-        <a:schemeClr val="lt1"/>
-      </a:fontRef>
-    </dgm:style>
-  </dgm:styleLbl>
-  <dgm:styleLbl name="node4">
-    <dgm:scene3d>
-      <a:camera prst="orthographicFront"/>
-      <a:lightRig rig="threePt" dir="t"/>
-    </dgm:scene3d>
-    <dgm:sp3d/>
-    <dgm:txPr/>
-    <dgm:style>
-      <a:lnRef idx="2">
-        <a:scrgbClr r="0" g="0" b="0"/>
-      </a:lnRef>
-      <a:fillRef idx="1">
-        <a:scrgbClr r="0" g="0" b="0"/>
-      </a:fillRef>
-      <a:effectRef idx="0">
-        <a:scrgbClr r="0" g="0" b="0"/>
-      </a:effectRef>
-      <a:fontRef idx="minor">
-        <a:schemeClr val="lt1"/>
-      </a:fontRef>
-    </dgm:style>
-  </dgm:styleLbl>
-  <dgm:styleLbl name="fgImgPlace1">
-    <dgm:scene3d>
-      <a:camera prst="orthographicFront"/>
-      <a:lightRig rig="threePt" dir="t"/>
-    </dgm:scene3d>
-    <dgm:sp3d/>
-    <dgm:txPr/>
-    <dgm:style>
-      <a:lnRef idx="2">
-        <a:scrgbClr r="0" g="0" b="0"/>
-      </a:lnRef>
-      <a:fillRef idx="1">
-        <a:scrgbClr r="0" g="0" b="0"/>
-      </a:fillRef>
-      <a:effectRef idx="0">
-        <a:scrgbClr r="0" g="0" b="0"/>
-      </a:effectRef>
-      <a:fontRef idx="minor"/>
-    </dgm:style>
-  </dgm:styleLbl>
-  <dgm:styleLbl name="alignImgPlace1">
-    <dgm:scene3d>
-      <a:camera prst="orthographicFront"/>
-      <a:lightRig rig="threePt" dir="t"/>
-    </dgm:scene3d>
-    <dgm:sp3d/>
-    <dgm:txPr/>
-    <dgm:style>
-      <a:lnRef idx="2">
-        <a:scrgbClr r="0" g="0" b="0"/>
-      </a:lnRef>
-      <a:fillRef idx="1">
-        <a:scrgbClr r="0" g="0" b="0"/>
-      </a:fillRef>
-      <a:effectRef idx="0">
-        <a:scrgbClr r="0" g="0" b="0"/>
-      </a:effectRef>
-      <a:fontRef idx="minor"/>
-    </dgm:style>
-  </dgm:styleLbl>
-  <dgm:styleLbl name="bgImgPlace1">
-    <dgm:scene3d>
-      <a:camera prst="orthographicFront"/>
-      <a:lightRig rig="threePt" dir="t"/>
-    </dgm:scene3d>
-    <dgm:sp3d/>
-    <dgm:txPr/>
-    <dgm:style>
-      <a:lnRef idx="2">
-        <a:scrgbClr r="0" g="0" b="0"/>
-      </a:lnRef>
-      <a:fillRef idx="1">
-        <a:scrgbClr r="0" g="0" b="0"/>
-      </a:fillRef>
-      <a:effectRef idx="0">
-        <a:scrgbClr r="0" g="0" b="0"/>
-      </a:effectRef>
-      <a:fontRef idx="minor"/>
-    </dgm:style>
-  </dgm:styleLbl>
-  <dgm:styleLbl name="sibTrans2D1">
-    <dgm:scene3d>
-      <a:camera prst="orthographicFront"/>
-      <a:lightRig rig="threePt" dir="t"/>
-    </dgm:scene3d>
-    <dgm:sp3d/>
-    <dgm:txPr/>
-    <dgm:style>
-      <a:lnRef idx="0">
-        <a:scrgbClr r="0" g="0" b="0"/>
-      </a:lnRef>
-      <a:fillRef idx="1">
-        <a:scrgbClr r="0" g="0" b="0"/>
-      </a:fillRef>
-      <a:effectRef idx="0">
-        <a:scrgbClr r="0" g="0" b="0"/>
-      </a:effectRef>
-      <a:fontRef idx="minor">
-        <a:schemeClr val="lt1"/>
-      </a:fontRef>
-    </dgm:style>
-  </dgm:styleLbl>
-  <dgm:styleLbl name="fgSibTrans2D1">
-    <dgm:scene3d>
-      <a:camera prst="orthographicFront"/>
-      <a:lightRig rig="threePt" dir="t"/>
-    </dgm:scene3d>
-    <dgm:sp3d/>
-    <dgm:txPr/>
-    <dgm:style>
-      <a:lnRef idx="0">
-        <a:scrgbClr r="0" g="0" b="0"/>
-      </a:lnRef>
-      <a:fillRef idx="1">
-        <a:scrgbClr r="0" g="0" b="0"/>
-      </a:fillRef>
-      <a:effectRef idx="0">
-        <a:scrgbClr r="0" g="0" b="0"/>
-      </a:effectRef>
-      <a:fontRef idx="minor">
-        <a:schemeClr val="lt1"/>
-      </a:fontRef>
-    </dgm:style>
-  </dgm:styleLbl>
-  <dgm:styleLbl name="bgSibTrans2D1">
-    <dgm:scene3d>
-      <a:camera prst="orthographicFront"/>
-      <a:lightRig rig="threePt" dir="t"/>
-    </dgm:scene3d>
-    <dgm:sp3d/>
-    <dgm:txPr/>
-    <dgm:style>
-      <a:lnRef idx="0">
-        <a:scrgbClr r="0" g="0" b="0"/>
-      </a:lnRef>
-      <a:fillRef idx="1">
-        <a:scrgbClr r="0" g="0" b="0"/>
-      </a:fillRef>
-      <a:effectRef idx="0">
-        <a:scrgbClr r="0" g="0" b="0"/>
-      </a:effectRef>
-      <a:fontRef idx="minor">
-        <a:schemeClr val="lt1"/>
-      </a:fontRef>
-    </dgm:style>
-  </dgm:styleLbl>
-  <dgm:styleLbl name="sibTrans1D1">
-    <dgm:scene3d>
-      <a:camera prst="orthographicFront"/>
-      <a:lightRig rig="threePt" dir="t"/>
-    </dgm:scene3d>
-    <dgm:sp3d/>
-    <dgm:txPr/>
-    <dgm:style>
-      <a:lnRef idx="1">
-        <a:scrgbClr r="0" g="0" b="0"/>
-      </a:lnRef>
-      <a:fillRef idx="0">
-        <a:scrgbClr r="0" g="0" b="0"/>
-      </a:fillRef>
-      <a:effectRef idx="0">
-        <a:scrgbClr r="0" g="0" b="0"/>
-      </a:effectRef>
-      <a:fontRef idx="minor"/>
-    </dgm:style>
-  </dgm:styleLbl>
-  <dgm:styleLbl name="callout">
-    <dgm:scene3d>
-      <a:camera prst="orthographicFront"/>
-      <a:lightRig rig="threePt" dir="t"/>
-    </dgm:scene3d>
-    <dgm:sp3d/>
-    <dgm:txPr/>
-    <dgm:style>
-      <a:lnRef idx="2">
-        <a:scrgbClr r="0" g="0" b="0"/>
-      </a:lnRef>
-      <a:fillRef idx="1">
-        <a:scrgbClr r="0" g="0" b="0"/>
-      </a:fillRef>
-      <a:effectRef idx="0">
-        <a:scrgbClr r="0" g="0" b="0"/>
-      </a:effectRef>
-      <a:fontRef idx="minor"/>
-    </dgm:style>
-  </dgm:styleLbl>
-  <dgm:styleLbl name="asst0">
-    <dgm:scene3d>
-      <a:camera prst="orthographicFront"/>
-      <a:lightRig rig="threePt" dir="t"/>
-    </dgm:scene3d>
-    <dgm:sp3d/>
-    <dgm:txPr/>
-    <dgm:style>
-      <a:lnRef idx="2">
-        <a:scrgbClr r="0" g="0" b="0"/>
-      </a:lnRef>
-      <a:fillRef idx="1">
-        <a:scrgbClr r="0" g="0" b="0"/>
-      </a:fillRef>
-      <a:effectRef idx="0">
-        <a:scrgbClr r="0" g="0" b="0"/>
-      </a:effectRef>
-      <a:fontRef idx="minor">
-        <a:schemeClr val="lt1"/>
-      </a:fontRef>
-    </dgm:style>
-  </dgm:styleLbl>
-  <dgm:styleLbl name="asst1">
-    <dgm:scene3d>
-      <a:camera prst="orthographicFront"/>
-      <a:lightRig rig="threePt" dir="t"/>
-    </dgm:scene3d>
-    <dgm:sp3d/>
-    <dgm:txPr/>
-    <dgm:style>
-      <a:lnRef idx="2">
-        <a:scrgbClr r="0" g="0" b="0"/>
-      </a:lnRef>
-      <a:fillRef idx="1">
-        <a:scrgbClr r="0" g="0" b="0"/>
-      </a:fillRef>
-      <a:effectRef idx="0">
-        <a:scrgbClr r="0" g="0" b="0"/>
-      </a:effectRef>
-      <a:fontRef idx="minor">
-        <a:schemeClr val="lt1"/>
-      </a:fontRef>
-    </dgm:style>
-  </dgm:styleLbl>
-  <dgm:styleLbl name="asst2">
-    <dgm:scene3d>
-      <a:camera prst="orthographicFront"/>
-      <a:lightRig rig="threePt" dir="t"/>
-    </dgm:scene3d>
-    <dgm:sp3d/>
-    <dgm:txPr/>
-    <dgm:style>
-      <a:lnRef idx="2">
-        <a:scrgbClr r="0" g="0" b="0"/>
-      </a:lnRef>
-      <a:fillRef idx="1">
-        <a:scrgbClr r="0" g="0" b="0"/>
-      </a:fillRef>
-      <a:effectRef idx="0">
-        <a:scrgbClr r="0" g="0" b="0"/>
-      </a:effectRef>
-      <a:fontRef idx="minor">
-        <a:schemeClr val="lt1"/>
-      </a:fontRef>
-    </dgm:style>
-  </dgm:styleLbl>
-  <dgm:styleLbl name="asst3">
-    <dgm:scene3d>
-      <a:camera prst="orthographicFront"/>
-      <a:lightRig rig="threePt" dir="t"/>
-    </dgm:scene3d>
-    <dgm:sp3d/>
-    <dgm:txPr/>
-    <dgm:style>
-      <a:lnRef idx="2">
-        <a:scrgbClr r="0" g="0" b="0"/>
-      </a:lnRef>
-      <a:fillRef idx="1">
-        <a:scrgbClr r="0" g="0" b="0"/>
-      </a:fillRef>
-      <a:effectRef idx="0">
-        <a:scrgbClr r="0" g="0" b="0"/>
-      </a:effectRef>
-      <a:fontRef idx="minor">
-        <a:schemeClr val="lt1"/>
-      </a:fontRef>
-    </dgm:style>
-  </dgm:styleLbl>
-  <dgm:styleLbl name="asst4">
-    <dgm:scene3d>
-      <a:camera prst="orthographicFront"/>
-      <a:lightRig rig="threePt" dir="t"/>
-    </dgm:scene3d>
-    <dgm:sp3d/>
-    <dgm:txPr/>
-    <dgm:style>
-      <a:lnRef idx="2">
-        <a:scrgbClr r="0" g="0" b="0"/>
-      </a:lnRef>
-      <a:fillRef idx="1">
-        <a:scrgbClr r="0" g="0" b="0"/>
-      </a:fillRef>
-      <a:effectRef idx="0">
-        <a:scrgbClr r="0" g="0" b="0"/>
-      </a:effectRef>
-      <a:fontRef idx="minor">
-        <a:schemeClr val="lt1"/>
-      </a:fontRef>
-    </dgm:style>
-  </dgm:styleLbl>
-  <dgm:styleLbl name="parChTrans2D1">
-    <dgm:scene3d>
-      <a:camera prst="orthographicFront"/>
-      <a:lightRig rig="threePt" dir="t"/>
-    </dgm:scene3d>
-    <dgm:sp3d/>
-    <dgm:txPr/>
-    <dgm:style>
-      <a:lnRef idx="2">
-        <a:scrgbClr r="0" g="0" b="0"/>
-      </a:lnRef>
-      <a:fillRef idx="1">
-        <a:scrgbClr r="0" g="0" b="0"/>
-      </a:fillRef>
-      <a:effectRef idx="0">
-        <a:scrgbClr r="0" g="0" b="0"/>
-      </a:effectRef>
-      <a:fontRef idx="minor">
-        <a:schemeClr val="lt1"/>
-      </a:fontRef>
-    </dgm:style>
-  </dgm:styleLbl>
-  <dgm:styleLbl name="parChTrans2D2">
-    <dgm:scene3d>
-      <a:camera prst="orthographicFront"/>
-      <a:lightRig rig="threePt" dir="t"/>
-    </dgm:scene3d>
-    <dgm:sp3d/>
-    <dgm:txPr/>
-    <dgm:style>
-      <a:lnRef idx="2">
-        <a:scrgbClr r="0" g="0" b="0"/>
-      </a:lnRef>
-      <a:fillRef idx="1">
-        <a:scrgbClr r="0" g="0" b="0"/>
-      </a:fillRef>
-      <a:effectRef idx="0">
-        <a:scrgbClr r="0" g="0" b="0"/>
-      </a:effectRef>
-      <a:fontRef idx="minor">
-        <a:schemeClr val="lt1"/>
-      </a:fontRef>
-    </dgm:style>
-  </dgm:styleLbl>
-  <dgm:styleLbl name="parChTrans2D3">
-    <dgm:scene3d>
-      <a:camera prst="orthographicFront"/>
-      <a:lightRig rig="threePt" dir="t"/>
-    </dgm:scene3d>
-    <dgm:sp3d/>
-    <dgm:txPr/>
-    <dgm:style>
-      <a:lnRef idx="2">
-        <a:scrgbClr r="0" g="0" b="0"/>
-      </a:lnRef>
-      <a:fillRef idx="1">
-        <a:scrgbClr r="0" g="0" b="0"/>
-      </a:fillRef>
-      <a:effectRef idx="0">
-        <a:scrgbClr r="0" g="0" b="0"/>
-      </a:effectRef>
-      <a:fontRef idx="minor">
-        <a:schemeClr val="lt1"/>
-      </a:fontRef>
-    </dgm:style>
-  </dgm:styleLbl>
-  <dgm:styleLbl name="parChTrans2D4">
-    <dgm:scene3d>
-      <a:camera prst="orthographicFront"/>
-      <a:lightRig rig="threePt" dir="t"/>
-    </dgm:scene3d>
-    <dgm:sp3d/>
-    <dgm:txPr/>
-    <dgm:style>
-      <a:lnRef idx="2">
-        <a:scrgbClr r="0" g="0" b="0"/>
-      </a:lnRef>
-      <a:fillRef idx="1">
-        <a:scrgbClr r="0" g="0" b="0"/>
-      </a:fillRef>
-      <a:effectRef idx="0">
-        <a:scrgbClr r="0" g="0" b="0"/>
-      </a:effectRef>
-      <a:fontRef idx="minor">
-        <a:schemeClr val="lt1"/>
-      </a:fontRef>
-    </dgm:style>
-  </dgm:styleLbl>
-  <dgm:styleLbl name="parChTrans1D1">
-    <dgm:scene3d>
-      <a:camera prst="orthographicFront"/>
-      <a:lightRig rig="threePt" dir="t"/>
-    </dgm:scene3d>
-    <dgm:sp3d/>
-    <dgm:txPr/>
-    <dgm:style>
-      <a:lnRef idx="2">
-        <a:scrgbClr r="0" g="0" b="0"/>
-      </a:lnRef>
-      <a:fillRef idx="0">
-        <a:scrgbClr r="0" g="0" b="0"/>
-      </a:fillRef>
-      <a:effectRef idx="0">
-        <a:scrgbClr r="0" g="0" b="0"/>
-      </a:effectRef>
-      <a:fontRef idx="minor"/>
-    </dgm:style>
-  </dgm:styleLbl>
-  <dgm:styleLbl name="parChTrans1D2">
-    <dgm:scene3d>
-      <a:camera prst="orthographicFront"/>
-      <a:lightRig rig="threePt" dir="t"/>
-    </dgm:scene3d>
-    <dgm:sp3d/>
-    <dgm:txPr/>
-    <dgm:style>
-      <a:lnRef idx="2">
-        <a:scrgbClr r="0" g="0" b="0"/>
-      </a:lnRef>
-      <a:fillRef idx="0">
-        <a:scrgbClr r="0" g="0" b="0"/>
-      </a:fillRef>
-      <a:effectRef idx="0">
-        <a:scrgbClr r="0" g="0" b="0"/>
-      </a:effectRef>
-      <a:fontRef idx="minor"/>
-    </dgm:style>
-  </dgm:styleLbl>
-  <dgm:styleLbl name="parChTrans1D3">
-    <dgm:scene3d>
-      <a:camera prst="orthographicFront"/>
-      <a:lightRig rig="threePt" dir="t"/>
-    </dgm:scene3d>
-    <dgm:sp3d/>
-    <dgm:txPr/>
-    <dgm:style>
-      <a:lnRef idx="2">
-        <a:scrgbClr r="0" g="0" b="0"/>
-      </a:lnRef>
-      <a:fillRef idx="0">
-        <a:scrgbClr r="0" g="0" b="0"/>
-      </a:fillRef>
-      <a:effectRef idx="0">
-        <a:scrgbClr r="0" g="0" b="0"/>
-      </a:effectRef>
-      <a:fontRef idx="minor"/>
-    </dgm:style>
-  </dgm:styleLbl>
-  <dgm:styleLbl name="parChTrans1D4">
-    <dgm:scene3d>
-      <a:camera prst="orthographicFront"/>
-      <a:lightRig rig="threePt" dir="t"/>
-    </dgm:scene3d>
-    <dgm:sp3d/>
-    <dgm:txPr/>
-    <dgm:style>
-      <a:lnRef idx="2">
-        <a:scrgbClr r="0" g="0" b="0"/>
-      </a:lnRef>
-      <a:fillRef idx="0">
-        <a:scrgbClr r="0" g="0" b="0"/>
-      </a:fillRef>
-      <a:effectRef idx="0">
-        <a:scrgbClr r="0" g="0" b="0"/>
-      </a:effectRef>
-      <a:fontRef idx="minor"/>
-    </dgm:style>
-  </dgm:styleLbl>
-  <dgm:styleLbl name="fgAcc1">
-    <dgm:scene3d>
-      <a:camera prst="orthographicFront"/>
-      <a:lightRig rig="threePt" dir="t"/>
-    </dgm:scene3d>
-    <dgm:sp3d/>
-    <dgm:txPr/>
-    <dgm:style>
-      <a:lnRef idx="2">
-        <a:scrgbClr r="0" g="0" b="0"/>
-      </a:lnRef>
-      <a:fillRef idx="1">
-        <a:scrgbClr r="0" g="0" b="0"/>
-      </a:fillRef>
-      <a:effectRef idx="0">
-        <a:scrgbClr r="0" g="0" b="0"/>
-      </a:effectRef>
-      <a:fontRef idx="minor"/>
-    </dgm:style>
-  </dgm:styleLbl>
-  <dgm:styleLbl name="conFgAcc1">
-    <dgm:scene3d>
-      <a:camera prst="orthographicFront"/>
-      <a:lightRig rig="threePt" dir="t"/>
-    </dgm:scene3d>
-    <dgm:sp3d/>
-    <dgm:txPr/>
-    <dgm:style>
-      <a:lnRef idx="2">
-        <a:scrgbClr r="0" g="0" b="0"/>
-      </a:lnRef>
-      <a:fillRef idx="1">
-        <a:scrgbClr r="0" g="0" b="0"/>
-      </a:fillRef>
-      <a:effectRef idx="0">
-        <a:scrgbClr r="0" g="0" b="0"/>
-      </a:effectRef>
-      <a:fontRef idx="minor"/>
-    </dgm:style>
-  </dgm:styleLbl>
-  <dgm:styleLbl name="alignAcc1">
-    <dgm:scene3d>
-      <a:camera prst="orthographicFront"/>
-      <a:lightRig rig="threePt" dir="t"/>
-    </dgm:scene3d>
-    <dgm:sp3d/>
-    <dgm:txPr/>
-    <dgm:style>
-      <a:lnRef idx="2">
-        <a:scrgbClr r="0" g="0" b="0"/>
-      </a:lnRef>
-      <a:fillRef idx="1">
-        <a:scrgbClr r="0" g="0" b="0"/>
-      </a:fillRef>
-      <a:effectRef idx="0">
-        <a:scrgbClr r="0" g="0" b="0"/>
-      </a:effectRef>
-      <a:fontRef idx="minor"/>
-    </dgm:style>
-  </dgm:styleLbl>
-  <dgm:styleLbl name="trAlignAcc1">
-    <dgm:scene3d>
-      <a:camera prst="orthographicFront"/>
-      <a:lightRig rig="threePt" dir="t"/>
-    </dgm:scene3d>
-    <dgm:sp3d/>
-    <dgm:txPr/>
-    <dgm:style>
-      <a:lnRef idx="1">
-        <a:scrgbClr r="0" g="0" b="0"/>
-      </a:lnRef>
-      <a:fillRef idx="1">
-        <a:scrgbClr r="0" g="0" b="0"/>
-      </a:fillRef>
-      <a:effectRef idx="0">
-        <a:scrgbClr r="0" g="0" b="0"/>
-      </a:effectRef>
-      <a:fontRef idx="minor"/>
-    </dgm:style>
-  </dgm:styleLbl>
-  <dgm:styleLbl name="bgAcc1">
-    <dgm:scene3d>
-      <a:camera prst="orthographicFront"/>
-      <a:lightRig rig="threePt" dir="t"/>
-    </dgm:scene3d>
-    <dgm:sp3d/>
-    <dgm:txPr/>
-    <dgm:style>
-      <a:lnRef idx="2">
-        <a:scrgbClr r="0" g="0" b="0"/>
-      </a:lnRef>
-      <a:fillRef idx="1">
-        <a:scrgbClr r="0" g="0" b="0"/>
-      </a:fillRef>
-      <a:effectRef idx="0">
-        <a:scrgbClr r="0" g="0" b="0"/>
-      </a:effectRef>
-      <a:fontRef idx="minor"/>
-    </dgm:style>
-  </dgm:styleLbl>
-  <dgm:styleLbl name="solidFgAcc1">
-    <dgm:scene3d>
-      <a:camera prst="orthographicFront"/>
-      <a:lightRig rig="threePt" dir="t"/>
-    </dgm:scene3d>
-    <dgm:sp3d/>
-    <dgm:txPr/>
-    <dgm:style>
-      <a:lnRef idx="2">
-        <a:scrgbClr r="0" g="0" b="0"/>
-      </a:lnRef>
-      <a:fillRef idx="1">
-        <a:scrgbClr r="0" g="0" b="0"/>
-      </a:fillRef>
-      <a:effectRef idx="0">
-        <a:scrgbClr r="0" g="0" b="0"/>
-      </a:effectRef>
-      <a:fontRef idx="minor"/>
-    </dgm:style>
-  </dgm:styleLbl>
-  <dgm:styleLbl name="solidAlignAcc1">
-    <dgm:scene3d>
-      <a:camera prst="orthographicFront"/>
-      <a:lightRig rig="threePt" dir="t"/>
-    </dgm:scene3d>
-    <dgm:sp3d/>
-    <dgm:txPr/>
-    <dgm:style>
-      <a:lnRef idx="2">
-        <a:scrgbClr r="0" g="0" b="0"/>
-      </a:lnRef>
-      <a:fillRef idx="1">
-        <a:scrgbClr r="0" g="0" b="0"/>
-      </a:fillRef>
-      <a:effectRef idx="0">
-        <a:scrgbClr r="0" g="0" b="0"/>
-      </a:effectRef>
-      <a:fontRef idx="minor"/>
-    </dgm:style>
-  </dgm:styleLbl>
-  <dgm:styleLbl name="solidBgAcc1">
-    <dgm:scene3d>
-      <a:camera prst="orthographicFront"/>
-      <a:lightRig rig="threePt" dir="t"/>
-    </dgm:scene3d>
-    <dgm:sp3d/>
-    <dgm:txPr/>
-    <dgm:style>
-      <a:lnRef idx="2">
-        <a:scrgbClr r="0" g="0" b="0"/>
-      </a:lnRef>
-      <a:fillRef idx="1">
-        <a:scrgbClr r="0" g="0" b="0"/>
-      </a:fillRef>
-      <a:effectRef idx="0">
-        <a:scrgbClr r="0" g="0" b="0"/>
-      </a:effectRef>
-      <a:fontRef idx="minor"/>
-    </dgm:style>
-  </dgm:styleLbl>
-  <dgm:styleLbl name="fgAccFollowNode1">
-    <dgm:scene3d>
-      <a:camera prst="orthographicFront"/>
-      <a:lightRig rig="threePt" dir="t"/>
-    </dgm:scene3d>
-    <dgm:sp3d/>
-    <dgm:txPr/>
-    <dgm:style>
-      <a:lnRef idx="2">
-        <a:scrgbClr r="0" g="0" b="0"/>
-      </a:lnRef>
-      <a:fillRef idx="1">
-        <a:scrgbClr r="0" g="0" b="0"/>
-      </a:fillRef>
-      <a:effectRef idx="0">
-        <a:scrgbClr r="0" g="0" b="0"/>
-      </a:effectRef>
-      <a:fontRef idx="minor"/>
-    </dgm:style>
-  </dgm:styleLbl>
-  <dgm:styleLbl name="alignAccFollowNode1">
-    <dgm:scene3d>
-      <a:camera prst="orthographicFront"/>
-      <a:lightRig rig="threePt" dir="t"/>
-    </dgm:scene3d>
-    <dgm:sp3d/>
-    <dgm:txPr/>
-    <dgm:style>
-      <a:lnRef idx="2">
-        <a:scrgbClr r="0" g="0" b="0"/>
-      </a:lnRef>
-      <a:fillRef idx="1">
-        <a:scrgbClr r="0" g="0" b="0"/>
-      </a:fillRef>
-      <a:effectRef idx="0">
-        <a:scrgbClr r="0" g="0" b="0"/>
-      </a:effectRef>
-      <a:fontRef idx="minor"/>
-    </dgm:style>
-  </dgm:styleLbl>
-  <dgm:styleLbl name="bgAccFollowNode1">
-    <dgm:scene3d>
-      <a:camera prst="orthographicFront"/>
-      <a:lightRig rig="threePt" dir="t"/>
-    </dgm:scene3d>
-    <dgm:sp3d/>
-    <dgm:txPr/>
-    <dgm:style>
-      <a:lnRef idx="2">
-        <a:scrgbClr r="0" g="0" b="0"/>
-      </a:lnRef>
-      <a:fillRef idx="1">
-        <a:scrgbClr r="0" g="0" b="0"/>
-      </a:fillRef>
-      <a:effectRef idx="0">
-        <a:scrgbClr r="0" g="0" b="0"/>
-      </a:effectRef>
-      <a:fontRef idx="minor"/>
-    </dgm:style>
-  </dgm:styleLbl>
-  <dgm:styleLbl name="fgAcc0">
-    <dgm:scene3d>
-      <a:camera prst="orthographicFront"/>
-      <a:lightRig rig="threePt" dir="t"/>
-    </dgm:scene3d>
-    <dgm:sp3d/>
-    <dgm:txPr/>
-    <dgm:style>
-      <a:lnRef idx="2">
-        <a:scrgbClr r="0" g="0" b="0"/>
-      </a:lnRef>
-      <a:fillRef idx="1">
-        <a:scrgbClr r="0" g="0" b="0"/>
-      </a:fillRef>
-      <a:effectRef idx="0">
-        <a:scrgbClr r="0" g="0" b="0"/>
-      </a:effectRef>
-      <a:fontRef idx="minor"/>
-    </dgm:style>
-  </dgm:styleLbl>
-  <dgm:styleLbl name="fgAcc2">
-    <dgm:scene3d>
-      <a:camera prst="orthographicFront"/>
-      <a:lightRig rig="threePt" dir="t"/>
-    </dgm:scene3d>
-    <dgm:sp3d/>
-    <dgm:txPr/>
-    <dgm:style>
-      <a:lnRef idx="2">
-        <a:scrgbClr r="0" g="0" b="0"/>
-      </a:lnRef>
-      <a:fillRef idx="1">
-        <a:scrgbClr r="0" g="0" b="0"/>
-      </a:fillRef>
-      <a:effectRef idx="0">
-        <a:scrgbClr r="0" g="0" b="0"/>
-      </a:effectRef>
-      <a:fontRef idx="minor"/>
-    </dgm:style>
-  </dgm:styleLbl>
-  <dgm:styleLbl name="fgAcc3">
-    <dgm:scene3d>
-      <a:camera prst="orthographicFront"/>
-      <a:lightRig rig="threePt" dir="t"/>
-    </dgm:scene3d>
-    <dgm:sp3d/>
-    <dgm:txPr/>
-    <dgm:style>
-      <a:lnRef idx="2">
-        <a:scrgbClr r="0" g="0" b="0"/>
-      </a:lnRef>
-      <a:fillRef idx="1">
-        <a:scrgbClr r="0" g="0" b="0"/>
-      </a:fillRef>
-      <a:effectRef idx="0">
-        <a:scrgbClr r="0" g="0" b="0"/>
-      </a:effectRef>
-      <a:fontRef idx="minor"/>
-    </dgm:style>
-  </dgm:styleLbl>
-  <dgm:styleLbl name="fgAcc4">
-    <dgm:scene3d>
-      <a:camera prst="orthographicFront"/>
-      <a:lightRig rig="threePt" dir="t"/>
-    </dgm:scene3d>
-    <dgm:sp3d/>
-    <dgm:txPr/>
-    <dgm:style>
-      <a:lnRef idx="2">
-        <a:scrgbClr r="0" g="0" b="0"/>
-      </a:lnRef>
-      <a:fillRef idx="1">
-        <a:scrgbClr r="0" g="0" b="0"/>
-      </a:fillRef>
-      <a:effectRef idx="0">
-        <a:scrgbClr r="0" g="0" b="0"/>
-      </a:effectRef>
-      <a:fontRef idx="minor"/>
-    </dgm:style>
-  </dgm:styleLbl>
-  <dgm:styleLbl name="bgShp">
-    <dgm:scene3d>
-      <a:camera prst="orthographicFront"/>
-      <a:lightRig rig="threePt" dir="t"/>
-    </dgm:scene3d>
-    <dgm:sp3d/>
-    <dgm:txPr/>
-    <dgm:style>
-      <a:lnRef idx="0">
-        <a:scrgbClr r="0" g="0" b="0"/>
-      </a:lnRef>
-      <a:fillRef idx="1">
-        <a:scrgbClr r="0" g="0" b="0"/>
-      </a:fillRef>
-      <a:effectRef idx="0">
-        <a:scrgbClr r="0" g="0" b="0"/>
-      </a:effectRef>
-      <a:fontRef idx="minor"/>
-    </dgm:style>
-  </dgm:styleLbl>
-  <dgm:styleLbl name="dkBgShp">
-    <dgm:scene3d>
-      <a:camera prst="orthographicFront"/>
-      <a:lightRig rig="threePt" dir="t"/>
-    </dgm:scene3d>
-    <dgm:sp3d/>
-    <dgm:txPr/>
-    <dgm:style>
-      <a:lnRef idx="0">
-        <a:scrgbClr r="0" g="0" b="0"/>
-      </a:lnRef>
-      <a:fillRef idx="1">
-        <a:scrgbClr r="0" g="0" b="0"/>
-      </a:fillRef>
-      <a:effectRef idx="0">
-        <a:scrgbClr r="0" g="0" b="0"/>
-      </a:effectRef>
-      <a:fontRef idx="minor"/>
-    </dgm:style>
-  </dgm:styleLbl>
-  <dgm:styleLbl name="trBgShp">
-    <dgm:scene3d>
-      <a:camera prst="orthographicFront"/>
-      <a:lightRig rig="threePt" dir="t"/>
-    </dgm:scene3d>
-    <dgm:sp3d/>
-    <dgm:txPr/>
-    <dgm:style>
-      <a:lnRef idx="0">
-        <a:scrgbClr r="0" g="0" b="0"/>
-      </a:lnRef>
-      <a:fillRef idx="1">
-        <a:scrgbClr r="0" g="0" b="0"/>
-      </a:fillRef>
-      <a:effectRef idx="0">
-        <a:scrgbClr r="0" g="0" b="0"/>
-      </a:effectRef>
-      <a:fontRef idx="minor"/>
-    </dgm:style>
-  </dgm:styleLbl>
-  <dgm:styleLbl name="fgShp">
-    <dgm:scene3d>
-      <a:camera prst="orthographicFront"/>
-      <a:lightRig rig="threePt" dir="t"/>
-    </dgm:scene3d>
-    <dgm:sp3d/>
-    <dgm:txPr/>
-    <dgm:style>
-      <a:lnRef idx="2">
-        <a:scrgbClr r="0" g="0" b="0"/>
-      </a:lnRef>
-      <a:fillRef idx="1">
-        <a:scrgbClr r="0" g="0" b="0"/>
-      </a:fillRef>
-      <a:effectRef idx="0">
-        <a:scrgbClr r="0" g="0" b="0"/>
-      </a:effectRef>
-      <a:fontRef idx="minor"/>
-    </dgm:style>
-  </dgm:styleLbl>
-  <dgm:styleLbl name="revTx">
-    <dgm:scene3d>
-      <a:camera prst="orthographicFront"/>
-      <a:lightRig rig="threePt" dir="t"/>
-    </dgm:scene3d>
-    <dgm:sp3d/>
-    <dgm:txPr/>
-    <dgm:style>
-      <a:lnRef idx="0">
-        <a:scrgbClr r="0" g="0" b="0"/>
-      </a:lnRef>
-      <a:fillRef idx="0">
-        <a:scrgbClr r="0" g="0" b="0"/>
-      </a:fillRef>
-      <a:effectRef idx="0">
-        <a:scrgbClr r="0" g="0" b="0"/>
-      </a:effectRef>
-      <a:fontRef idx="minor"/>
-    </dgm:style>
-  </dgm:styleLbl>
-</dgm:styleDef>
-</file>
-
 <file path=ppt/slideLayouts/slideLayout1.xml><?xml version="1.0" encoding="utf-8"?>
 <p:sldLayout xmlns:a="http://schemas.openxmlformats.org/drawingml/2006/main" xmlns:r="http://schemas.openxmlformats.org/officeDocument/2006/relationships" xmlns:p="http://schemas.openxmlformats.org/presentationml/2006/main" type="title" preserve="1">
   <p:cSld name="Title Slide">
@@ -7587,6 +4375,7 @@
           <a:p>
             <a:pPr algn="ctr" defTabSz="914400"/>
             <a:r>
+              <a:rPr dirty="0"/>
               <a:t>Company History</a:t>
             </a:r>
           </a:p>
@@ -7621,6 +4410,7 @@
           <a:p>
             <a:pPr defTabSz="914400"/>
             <a:r>
+              <a:rPr dirty="0"/>
               <a:t>IMN Solutions PVT LTD is the software company, established in 1987, by George Milton. The company has been listed as the trusted partner for many high-profile organizations since 1988 and got awards for quality products from reputed organizations.</a:t>
             </a:r>
           </a:p>
@@ -7657,6 +4447,7 @@
               <a:buAutoNum type="arabicPeriod"/>
             </a:pPr>
             <a:r>
+              <a:rPr dirty="0"/>
               <a:t>The company acquired the MCY corporation for 20 billion dollars and became the top revenue maker for the year 2015.</a:t>
             </a:r>
           </a:p>
@@ -7665,6 +4456,7 @@
               <a:buAutoNum type="arabicPeriod"/>
             </a:pPr>
             <a:r>
+              <a:rPr dirty="0"/>
               <a:t>The company is participating in top open source projects in automation industry.</a:t>
             </a:r>
           </a:p>
@@ -7817,73 +4609,6 @@
 </file>
 
 <file path=ppt/slides/slide3.xml><?xml version="1.0" encoding="utf-8"?>
-<p:sld xmlns:a="http://schemas.openxmlformats.org/drawingml/2006/main" xmlns:r="http://schemas.openxmlformats.org/officeDocument/2006/relationships" xmlns:p="http://schemas.openxmlformats.org/presentationml/2006/main">
-  <p:cSld>
-    <p:bg>
-      <p:bgPr>
-        <a:blipFill>
-          <a:blip r:embed="rId2"/>
-          <a:tile tx="0" ty="0" sx="100000" sy="100000" flip="none" algn="tl"/>
-        </a:blipFill>
-        <a:effectLst/>
-      </p:bgPr>
-    </p:bg>
-    <p:spTree>
-      <p:nvGrpSpPr>
-        <p:cNvPr id="1" name=""/>
-        <p:cNvGrpSpPr/>
-        <p:nvPr/>
-      </p:nvGrpSpPr>
-      <p:grpSpPr>
-        <a:xfrm>
-          <a:off x="0" y="0"/>
-          <a:ext cx="0" cy="0"/>
-          <a:chOff x="0" y="0"/>
-          <a:chExt cx="0" cy="0"/>
-        </a:xfrm>
-      </p:grpSpPr>
-      <p:graphicFrame>
-        <p:nvGraphicFramePr>
-          <p:cNvPr id="3" name="Diagram 2">
-            <a:extLst>
-              <a:ext uri="{FF2B5EF4-FFF2-40B4-BE49-F238E27FC236}">
-                <a16:creationId xmlns:a16="http://schemas.microsoft.com/office/drawing/2014/main" id="{7256160C-8C19-4589-9FC7-4CF03EF728A6}"/>
-              </a:ext>
-            </a:extLst>
-          </p:cNvPr>
-          <p:cNvGraphicFramePr/>
-          <p:nvPr>
-            <p:extLst>
-              <p:ext uri="{D42A27DB-BD31-4B8C-83A1-F6EECF244321}">
-                <p14:modId xmlns:p14="http://schemas.microsoft.com/office/powerpoint/2010/main" val="2761564853"/>
-              </p:ext>
-            </p:extLst>
-          </p:nvPr>
-        </p:nvGraphicFramePr>
-        <p:xfrm>
-          <a:off x="2032000" y="719666"/>
-          <a:ext cx="8128000" cy="5418667"/>
-        </p:xfrm>
-        <a:graphic>
-          <a:graphicData uri="http://schemas.openxmlformats.org/drawingml/2006/diagram">
-            <dgm:relIds xmlns:dgm="http://schemas.openxmlformats.org/drawingml/2006/diagram" xmlns:r="http://schemas.openxmlformats.org/officeDocument/2006/relationships" r:dm="rId3" r:lo="rId4" r:qs="rId5" r:cs="rId6"/>
-          </a:graphicData>
-        </a:graphic>
-      </p:graphicFrame>
-    </p:spTree>
-    <p:extLst>
-      <p:ext uri="{BB962C8B-B14F-4D97-AF65-F5344CB8AC3E}">
-        <p14:creationId xmlns:p14="http://schemas.microsoft.com/office/powerpoint/2010/main" val="434134414"/>
-      </p:ext>
-    </p:extLst>
-  </p:cSld>
-  <p:clrMapOvr>
-    <a:masterClrMapping/>
-  </p:clrMapOvr>
-</p:sld>
-</file>
-
-<file path=ppt/slides/slide4.xml><?xml version="1.0" encoding="utf-8"?>
 <p:sld xmlns:a="http://schemas.openxmlformats.org/drawingml/2006/main" xmlns:r="http://schemas.openxmlformats.org/officeDocument/2006/relationships" xmlns:p="http://schemas.openxmlformats.org/presentationml/2006/main">
   <p:cSld>
     <p:spTree>

</xml_diff>